<commit_message>
Update the architecture diagram pptx
</commit_message>
<xml_diff>
--- a/docs/images/ClickHouse_architecture.pptx
+++ b/docs/images/ClickHouse_architecture.pptx
@@ -359,7 +359,7 @@
           <a:p>
             <a:fld id="{D2887149-AF03-6142-908A-3DD284EAF54B}" type="datetimeFigureOut">
               <a:rPr lang="en-US" smtClean="0"/>
-              <a:t>6/24/21</a:t>
+              <a:t>6/29/21</a:t>
             </a:fld>
             <a:endParaRPr lang="en-US"/>
           </a:p>
@@ -541,7 +541,7 @@
             <a:fld id="{0B25AC41-3BEC-9247-8322-91B80C013F2D}" type="datetimeFigureOut">
               <a:rPr lang="en-US" smtClean="0"/>
               <a:pPr/>
-              <a:t>6/24/21</a:t>
+              <a:t>6/29/21</a:t>
             </a:fld>
             <a:endParaRPr lang="en-US" dirty="0"/>
           </a:p>
@@ -12471,10 +12471,10 @@
       </p:sp>
       <p:sp>
         <p:nvSpPr>
-          <p:cNvPr id="6" name="Rectangle 5">
+          <p:cNvPr id="121" name="Rectangle 120">
             <a:extLst>
               <a:ext uri="{FF2B5EF4-FFF2-40B4-BE49-F238E27FC236}">
-                <a16:creationId xmlns:a16="http://schemas.microsoft.com/office/drawing/2014/main" id="{891683AA-70EC-2E44-B24D-04968EE96747}"/>
+                <a16:creationId xmlns:a16="http://schemas.microsoft.com/office/drawing/2014/main" id="{62C6134F-F85F-4348-8CE5-9E4018AFA5FE}"/>
               </a:ext>
             </a:extLst>
           </p:cNvPr>
@@ -12538,10 +12538,10 @@
       </p:sp>
       <p:sp>
         <p:nvSpPr>
-          <p:cNvPr id="7" name="Rectangle 6">
+          <p:cNvPr id="136" name="Rectangle 135">
             <a:extLst>
               <a:ext uri="{FF2B5EF4-FFF2-40B4-BE49-F238E27FC236}">
-                <a16:creationId xmlns:a16="http://schemas.microsoft.com/office/drawing/2014/main" id="{F95F0B2B-64CE-4D40-A2AB-B4E8FDE72B5C}"/>
+                <a16:creationId xmlns:a16="http://schemas.microsoft.com/office/drawing/2014/main" id="{072412AD-2027-5843-A62B-CFC8D989D3BD}"/>
               </a:ext>
             </a:extLst>
           </p:cNvPr>
@@ -12551,7 +12551,7 @@
         <p:spPr bwMode="auto">
           <a:xfrm>
             <a:off x="468002" y="1009332"/>
-            <a:ext cx="5853279" cy="4066222"/>
+            <a:ext cx="6069531" cy="4066222"/>
           </a:xfrm>
           <a:prstGeom prst="rect">
             <a:avLst/>
@@ -12604,10 +12604,10 @@
       </p:sp>
       <p:sp>
         <p:nvSpPr>
-          <p:cNvPr id="8" name="Rectangle 7">
+          <p:cNvPr id="137" name="Rectangle 136">
             <a:extLst>
               <a:ext uri="{FF2B5EF4-FFF2-40B4-BE49-F238E27FC236}">
-                <a16:creationId xmlns:a16="http://schemas.microsoft.com/office/drawing/2014/main" id="{BA9840E7-CA80-BE49-AAFA-9D9A5DD1B12A}"/>
+                <a16:creationId xmlns:a16="http://schemas.microsoft.com/office/drawing/2014/main" id="{80299917-5CFA-584E-B38D-99C6722EB9EF}"/>
               </a:ext>
             </a:extLst>
           </p:cNvPr>
@@ -12674,10 +12674,10 @@
       </p:sp>
       <p:sp>
         <p:nvSpPr>
-          <p:cNvPr id="9" name="Rectangle 8">
+          <p:cNvPr id="138" name="Rectangle 137">
             <a:extLst>
               <a:ext uri="{FF2B5EF4-FFF2-40B4-BE49-F238E27FC236}">
-                <a16:creationId xmlns:a16="http://schemas.microsoft.com/office/drawing/2014/main" id="{D9533D32-1AA1-6C42-86C6-ABB5A72B434D}"/>
+                <a16:creationId xmlns:a16="http://schemas.microsoft.com/office/drawing/2014/main" id="{054672CF-4B07-3640-B239-D1AD4C6E1A3D}"/>
               </a:ext>
             </a:extLst>
           </p:cNvPr>
@@ -12741,10 +12741,10 @@
       </p:sp>
       <p:pic>
         <p:nvPicPr>
-          <p:cNvPr id="11" name="Graphic 12">
+          <p:cNvPr id="139" name="Graphic 13">
             <a:extLst>
               <a:ext uri="{FF2B5EF4-FFF2-40B4-BE49-F238E27FC236}">
-                <a16:creationId xmlns:a16="http://schemas.microsoft.com/office/drawing/2014/main" id="{C82F099A-D725-7449-926A-11ABA2790954}"/>
+                <a16:creationId xmlns:a16="http://schemas.microsoft.com/office/drawing/2014/main" id="{FCA068FF-11DA-6247-99AA-2B0453E1B5C5}"/>
               </a:ext>
             </a:extLst>
           </p:cNvPr>
@@ -12768,7 +12768,7 @@
         </p:blipFill>
         <p:spPr bwMode="auto">
           <a:xfrm>
-            <a:off x="475102" y="1009332"/>
+            <a:off x="558368" y="1298109"/>
             <a:ext cx="191244" cy="172376"/>
           </a:xfrm>
           <a:prstGeom prst="rect">
@@ -12799,72 +12799,12 @@
           </a:extLst>
         </p:spPr>
       </p:pic>
-      <p:pic>
-        <p:nvPicPr>
-          <p:cNvPr id="12" name="Graphic 13">
-            <a:extLst>
-              <a:ext uri="{FF2B5EF4-FFF2-40B4-BE49-F238E27FC236}">
-                <a16:creationId xmlns:a16="http://schemas.microsoft.com/office/drawing/2014/main" id="{A28E87DC-DF1C-7746-B4F4-44C53420D24E}"/>
-              </a:ext>
-            </a:extLst>
-          </p:cNvPr>
-          <p:cNvPicPr>
-            <a:picLocks noChangeAspect="1" noChangeArrowheads="1"/>
-          </p:cNvPicPr>
-          <p:nvPr/>
-        </p:nvPicPr>
-        <p:blipFill>
-          <a:blip r:embed="rId4">
-            <a:extLst>
-              <a:ext uri="{28A0092B-C50C-407E-A947-70E740481C1C}">
-                <a14:useLocalDpi xmlns:a14="http://schemas.microsoft.com/office/drawing/2010/main" val="0"/>
-              </a:ext>
-            </a:extLst>
-          </a:blip>
-          <a:srcRect/>
-          <a:stretch>
-            <a:fillRect/>
-          </a:stretch>
-        </p:blipFill>
-        <p:spPr bwMode="auto">
-          <a:xfrm>
-            <a:off x="566914" y="1417753"/>
-            <a:ext cx="191244" cy="172376"/>
-          </a:xfrm>
-          <a:prstGeom prst="rect">
-            <a:avLst/>
-          </a:prstGeom>
-          <a:noFill/>
-          <a:ln>
-            <a:noFill/>
-          </a:ln>
-          <a:extLst>
-            <a:ext uri="{909E8E84-426E-40DD-AFC4-6F175D3DCCD1}">
-              <a14:hiddenFill xmlns:a14="http://schemas.microsoft.com/office/drawing/2010/main">
-                <a:solidFill>
-                  <a:srgbClr val="FFFFFF"/>
-                </a:solidFill>
-              </a14:hiddenFill>
-            </a:ext>
-            <a:ext uri="{91240B29-F687-4F45-9708-019B960494DF}">
-              <a14:hiddenLine xmlns:a14="http://schemas.microsoft.com/office/drawing/2010/main" w="9525">
-                <a:solidFill>
-                  <a:srgbClr val="000000"/>
-                </a:solidFill>
-                <a:miter lim="800000"/>
-                <a:headEnd/>
-                <a:tailEnd/>
-              </a14:hiddenLine>
-            </a:ext>
-          </a:extLst>
-        </p:spPr>
-      </p:pic>
       <p:sp>
         <p:nvSpPr>
-          <p:cNvPr id="13" name="Rectangle 12">
+          <p:cNvPr id="140" name="Rectangle 139">
             <a:extLst>
               <a:ext uri="{FF2B5EF4-FFF2-40B4-BE49-F238E27FC236}">
-                <a16:creationId xmlns:a16="http://schemas.microsoft.com/office/drawing/2014/main" id="{379BD9A7-AED1-1C46-A5A2-58DE86EE8D4F}"/>
+                <a16:creationId xmlns:a16="http://schemas.microsoft.com/office/drawing/2014/main" id="{62024B14-FD8D-5A4E-BC96-2EA92EB40C46}"/>
               </a:ext>
             </a:extLst>
           </p:cNvPr>
@@ -12931,10 +12871,10 @@
       </p:sp>
       <p:sp>
         <p:nvSpPr>
-          <p:cNvPr id="34" name="Rectangle 33">
+          <p:cNvPr id="141" name="Rectangle 140">
             <a:extLst>
               <a:ext uri="{FF2B5EF4-FFF2-40B4-BE49-F238E27FC236}">
-                <a16:creationId xmlns:a16="http://schemas.microsoft.com/office/drawing/2014/main" id="{2103515C-7640-684B-B23A-3772567BEDC8}"/>
+                <a16:creationId xmlns:a16="http://schemas.microsoft.com/office/drawing/2014/main" id="{8C4AA612-A5B9-8E4D-B036-744FF89B78C6}"/>
               </a:ext>
             </a:extLst>
           </p:cNvPr>
@@ -13003,10 +12943,10 @@
       </p:sp>
       <p:pic>
         <p:nvPicPr>
-          <p:cNvPr id="35" name="Graphic 13">
+          <p:cNvPr id="142" name="Graphic 13">
             <a:extLst>
               <a:ext uri="{FF2B5EF4-FFF2-40B4-BE49-F238E27FC236}">
-                <a16:creationId xmlns:a16="http://schemas.microsoft.com/office/drawing/2014/main" id="{A19325D2-00D6-AA41-8D6A-36DA45D6D965}"/>
+                <a16:creationId xmlns:a16="http://schemas.microsoft.com/office/drawing/2014/main" id="{4FC4258A-FA5D-9346-9CD1-26E2FC4482EF}"/>
               </a:ext>
             </a:extLst>
           </p:cNvPr>
@@ -13016,7 +12956,7 @@
           <p:nvPr/>
         </p:nvPicPr>
         <p:blipFill>
-          <a:blip r:embed="rId5">
+          <a:blip r:embed="rId4">
             <a:extLst>
               <a:ext uri="{28A0092B-C50C-407E-A947-70E740481C1C}">
                 <a14:useLocalDpi xmlns:a14="http://schemas.microsoft.com/office/drawing/2010/main" val="0"/>
@@ -13063,10 +13003,10 @@
       </p:pic>
       <p:sp>
         <p:nvSpPr>
-          <p:cNvPr id="43" name="Rectangle 42">
+          <p:cNvPr id="143" name="Rectangle 142">
             <a:extLst>
               <a:ext uri="{FF2B5EF4-FFF2-40B4-BE49-F238E27FC236}">
-                <a16:creationId xmlns:a16="http://schemas.microsoft.com/office/drawing/2014/main" id="{D5517281-F8D6-3B4A-B04E-AFD8B923CA16}"/>
+                <a16:creationId xmlns:a16="http://schemas.microsoft.com/office/drawing/2014/main" id="{049AED71-D84E-1F46-BF25-3A3B6E903DDD}"/>
               </a:ext>
             </a:extLst>
           </p:cNvPr>
@@ -13135,10 +13075,10 @@
       </p:sp>
       <p:pic>
         <p:nvPicPr>
-          <p:cNvPr id="44" name="Graphic 35">
+          <p:cNvPr id="144" name="Graphic 35">
             <a:extLst>
               <a:ext uri="{FF2B5EF4-FFF2-40B4-BE49-F238E27FC236}">
-                <a16:creationId xmlns:a16="http://schemas.microsoft.com/office/drawing/2014/main" id="{6EA548F1-7B02-684D-A0DD-490463827F0F}"/>
+                <a16:creationId xmlns:a16="http://schemas.microsoft.com/office/drawing/2014/main" id="{AAFB34E0-BCA1-D748-819F-72E941DB766D}"/>
               </a:ext>
             </a:extLst>
           </p:cNvPr>
@@ -13148,7 +13088,7 @@
           <p:nvPr/>
         </p:nvPicPr>
         <p:blipFill>
-          <a:blip r:embed="rId6">
+          <a:blip r:embed="rId5">
             <a:extLst>
               <a:ext uri="{28A0092B-C50C-407E-A947-70E740481C1C}">
                 <a14:useLocalDpi xmlns:a14="http://schemas.microsoft.com/office/drawing/2010/main" val="0"/>
@@ -13195,10 +13135,10 @@
       </p:pic>
       <p:pic>
         <p:nvPicPr>
-          <p:cNvPr id="46" name="Graphic 13">
+          <p:cNvPr id="145" name="Graphic 13">
             <a:extLst>
               <a:ext uri="{FF2B5EF4-FFF2-40B4-BE49-F238E27FC236}">
-                <a16:creationId xmlns:a16="http://schemas.microsoft.com/office/drawing/2014/main" id="{63B06606-E582-5748-8318-B7FED5175A65}"/>
+                <a16:creationId xmlns:a16="http://schemas.microsoft.com/office/drawing/2014/main" id="{4201F907-1C2E-4E48-9D4B-3C152E589180}"/>
               </a:ext>
             </a:extLst>
           </p:cNvPr>
@@ -13208,7 +13148,7 @@
           <p:nvPr/>
         </p:nvPicPr>
         <p:blipFill>
-          <a:blip r:embed="rId5">
+          <a:blip r:embed="rId4">
             <a:extLst>
               <a:ext uri="{28A0092B-C50C-407E-A947-70E740481C1C}">
                 <a14:useLocalDpi xmlns:a14="http://schemas.microsoft.com/office/drawing/2010/main" val="0"/>
@@ -13255,10 +13195,10 @@
       </p:pic>
       <p:sp>
         <p:nvSpPr>
-          <p:cNvPr id="49" name="Rectangle 48">
+          <p:cNvPr id="146" name="Rectangle 145">
             <a:extLst>
               <a:ext uri="{FF2B5EF4-FFF2-40B4-BE49-F238E27FC236}">
-                <a16:creationId xmlns:a16="http://schemas.microsoft.com/office/drawing/2014/main" id="{99CF00DA-185C-1A4F-BE1A-AA572A7967CB}"/>
+                <a16:creationId xmlns:a16="http://schemas.microsoft.com/office/drawing/2014/main" id="{482D4D92-FEED-0E48-8DB1-EC59F8E38660}"/>
               </a:ext>
             </a:extLst>
           </p:cNvPr>
@@ -13327,10 +13267,10 @@
       </p:sp>
       <p:pic>
         <p:nvPicPr>
-          <p:cNvPr id="50" name="Graphic 35">
+          <p:cNvPr id="147" name="Graphic 35">
             <a:extLst>
               <a:ext uri="{FF2B5EF4-FFF2-40B4-BE49-F238E27FC236}">
-                <a16:creationId xmlns:a16="http://schemas.microsoft.com/office/drawing/2014/main" id="{04D5F352-0A3C-7C4A-9BE4-26110EA6575E}"/>
+                <a16:creationId xmlns:a16="http://schemas.microsoft.com/office/drawing/2014/main" id="{26D0C976-3646-B94F-9532-EBADA59F44F2}"/>
               </a:ext>
             </a:extLst>
           </p:cNvPr>
@@ -13340,7 +13280,7 @@
           <p:nvPr/>
         </p:nvPicPr>
         <p:blipFill>
-          <a:blip r:embed="rId6">
+          <a:blip r:embed="rId5">
             <a:extLst>
               <a:ext uri="{28A0092B-C50C-407E-A947-70E740481C1C}">
                 <a14:useLocalDpi xmlns:a14="http://schemas.microsoft.com/office/drawing/2010/main" val="0"/>
@@ -13387,10 +13327,10 @@
       </p:pic>
       <p:pic>
         <p:nvPicPr>
-          <p:cNvPr id="51" name="Graphic 23">
+          <p:cNvPr id="148" name="Graphic 23">
             <a:extLst>
               <a:ext uri="{FF2B5EF4-FFF2-40B4-BE49-F238E27FC236}">
-                <a16:creationId xmlns:a16="http://schemas.microsoft.com/office/drawing/2014/main" id="{413CC512-8613-3341-8DE0-F504B64BAB3E}"/>
+                <a16:creationId xmlns:a16="http://schemas.microsoft.com/office/drawing/2014/main" id="{8A9A44F6-13C9-4349-98E9-D4D3FC8F429B}"/>
               </a:ext>
             </a:extLst>
           </p:cNvPr>
@@ -13400,7 +13340,7 @@
           <p:nvPr/>
         </p:nvPicPr>
         <p:blipFill>
-          <a:blip r:embed="rId7">
+          <a:blip r:embed="rId6">
             <a:extLst>
               <a:ext uri="{28A0092B-C50C-407E-A947-70E740481C1C}">
                 <a14:useLocalDpi xmlns:a14="http://schemas.microsoft.com/office/drawing/2010/main" val="0"/>
@@ -13447,10 +13387,10 @@
       </p:pic>
       <p:sp>
         <p:nvSpPr>
-          <p:cNvPr id="52" name="Rectangle 51">
+          <p:cNvPr id="149" name="Rectangle 148">
             <a:extLst>
               <a:ext uri="{FF2B5EF4-FFF2-40B4-BE49-F238E27FC236}">
-                <a16:creationId xmlns:a16="http://schemas.microsoft.com/office/drawing/2014/main" id="{90CD896E-E7DE-DF48-81EA-E3BE95781CA8}"/>
+                <a16:creationId xmlns:a16="http://schemas.microsoft.com/office/drawing/2014/main" id="{327B0845-7518-C743-9996-8E4174D783A5}"/>
               </a:ext>
             </a:extLst>
           </p:cNvPr>
@@ -13460,7 +13400,7 @@
         <p:spPr>
           <a:xfrm>
             <a:off x="1610190" y="2013885"/>
-            <a:ext cx="1054444" cy="311130"/>
+            <a:ext cx="1054444" cy="209456"/>
           </a:xfrm>
           <a:prstGeom prst="rect">
             <a:avLst/>
@@ -13501,39 +13441,6 @@
               </a:spcAft>
               <a:defRPr/>
             </a:pPr>
-            <a:r>
-              <a:rPr lang="en-US" altLang="zh-CN" sz="600" dirty="0">
-                <a:ln w="0"/>
-                <a:solidFill>
-                  <a:srgbClr val="D86613"/>
-                </a:solidFill>
-                <a:latin typeface="Arial" panose="020B0604020202020204" pitchFamily="34" charset="0"/>
-                <a:cs typeface="Arial" panose="020B0604020202020204" pitchFamily="34" charset="0"/>
-              </a:rPr>
-              <a:t>Bastion</a:t>
-            </a:r>
-            <a:r>
-              <a:rPr lang="zh-CN" altLang="en-US" sz="600" dirty="0">
-                <a:ln w="0"/>
-                <a:solidFill>
-                  <a:srgbClr val="D86613"/>
-                </a:solidFill>
-                <a:latin typeface="Arial" panose="020B0604020202020204" pitchFamily="34" charset="0"/>
-                <a:cs typeface="Arial" panose="020B0604020202020204" pitchFamily="34" charset="0"/>
-              </a:rPr>
-              <a:t> </a:t>
-            </a:r>
-            <a:r>
-              <a:rPr lang="en-US" altLang="zh-CN" sz="600" dirty="0">
-                <a:ln w="0"/>
-                <a:solidFill>
-                  <a:srgbClr val="D86613"/>
-                </a:solidFill>
-                <a:latin typeface="Arial" panose="020B0604020202020204" pitchFamily="34" charset="0"/>
-                <a:cs typeface="Arial" panose="020B0604020202020204" pitchFamily="34" charset="0"/>
-              </a:rPr>
-              <a:t>Instance</a:t>
-            </a:r>
             <a:endParaRPr lang="en-US" sz="600" dirty="0">
               <a:ln w="0"/>
               <a:solidFill>
@@ -13547,10 +13454,10 @@
       </p:sp>
       <p:sp>
         <p:nvSpPr>
-          <p:cNvPr id="69" name="Rectangle 68">
+          <p:cNvPr id="150" name="Rectangle 149">
             <a:extLst>
               <a:ext uri="{FF2B5EF4-FFF2-40B4-BE49-F238E27FC236}">
-                <a16:creationId xmlns:a16="http://schemas.microsoft.com/office/drawing/2014/main" id="{53D2A468-574F-C54B-B0AD-E2C0E5DD93E8}"/>
+                <a16:creationId xmlns:a16="http://schemas.microsoft.com/office/drawing/2014/main" id="{5B236199-493C-3042-89D3-7AE33D41515B}"/>
               </a:ext>
             </a:extLst>
           </p:cNvPr>
@@ -13559,8 +13466,8 @@
         </p:nvSpPr>
         <p:spPr>
           <a:xfrm>
-            <a:off x="1518983" y="1976001"/>
-            <a:ext cx="3621001" cy="417929"/>
+            <a:off x="1518983" y="1976002"/>
+            <a:ext cx="3621001" cy="327430"/>
           </a:xfrm>
           <a:prstGeom prst="rect">
             <a:avLst/>
@@ -13610,53 +13517,14 @@
               <a:cs typeface="Arial" panose="020B0604020202020204" pitchFamily="34" charset="0"/>
             </a:endParaRPr>
           </a:p>
-          <a:p>
-            <a:pPr algn="ctr" eaLnBrk="1" fontAlgn="auto" hangingPunct="1">
-              <a:spcBef>
-                <a:spcPts val="0"/>
-              </a:spcBef>
-              <a:spcAft>
-                <a:spcPts val="0"/>
-              </a:spcAft>
-              <a:defRPr/>
-            </a:pPr>
-            <a:endParaRPr lang="en-US" sz="600" dirty="0">
-              <a:solidFill>
-                <a:srgbClr val="D86613"/>
-              </a:solidFill>
-              <a:latin typeface="Arial" panose="020B0604020202020204" pitchFamily="34" charset="0"/>
-              <a:cs typeface="Arial" panose="020B0604020202020204" pitchFamily="34" charset="0"/>
-            </a:endParaRPr>
-          </a:p>
-          <a:p>
-            <a:pPr algn="ctr" eaLnBrk="1" fontAlgn="auto" hangingPunct="1">
-              <a:spcBef>
-                <a:spcPts val="0"/>
-              </a:spcBef>
-              <a:spcAft>
-                <a:spcPts val="0"/>
-              </a:spcAft>
-              <a:defRPr/>
-            </a:pPr>
-            <a:r>
-              <a:rPr lang="en-US" sz="600" dirty="0">
-                <a:solidFill>
-                  <a:srgbClr val="D86613"/>
-                </a:solidFill>
-                <a:latin typeface="Arial" panose="020B0604020202020204" pitchFamily="34" charset="0"/>
-                <a:cs typeface="Arial" panose="020B0604020202020204" pitchFamily="34" charset="0"/>
-              </a:rPr>
-              <a:t>Auto Scaling group</a:t>
-            </a:r>
-          </a:p>
         </p:txBody>
       </p:sp>
       <p:pic>
         <p:nvPicPr>
-          <p:cNvPr id="70" name="Graphic 18">
+          <p:cNvPr id="151" name="Graphic 18">
             <a:extLst>
               <a:ext uri="{FF2B5EF4-FFF2-40B4-BE49-F238E27FC236}">
-                <a16:creationId xmlns:a16="http://schemas.microsoft.com/office/drawing/2014/main" id="{0138FA58-B76B-AD40-8990-8157034C99E3}"/>
+                <a16:creationId xmlns:a16="http://schemas.microsoft.com/office/drawing/2014/main" id="{04F36520-1CC3-F54D-A594-C1261C01C2D9}"/>
               </a:ext>
             </a:extLst>
           </p:cNvPr>
@@ -13666,7 +13534,7 @@
           <p:nvPr/>
         </p:nvPicPr>
         <p:blipFill>
-          <a:blip r:embed="rId8">
+          <a:blip r:embed="rId7">
             <a:extLst>
               <a:ext uri="{28A0092B-C50C-407E-A947-70E740481C1C}">
                 <a14:useLocalDpi xmlns:a14="http://schemas.microsoft.com/office/drawing/2010/main" val="0"/>
@@ -13713,10 +13581,10 @@
       </p:pic>
       <p:sp>
         <p:nvSpPr>
-          <p:cNvPr id="45" name="Rectangle 44">
+          <p:cNvPr id="152" name="Rectangle 151">
             <a:extLst>
               <a:ext uri="{FF2B5EF4-FFF2-40B4-BE49-F238E27FC236}">
-                <a16:creationId xmlns:a16="http://schemas.microsoft.com/office/drawing/2014/main" id="{88765A0C-B791-4F48-807C-535A07AADD7A}"/>
+                <a16:creationId xmlns:a16="http://schemas.microsoft.com/office/drawing/2014/main" id="{E6564B93-2C6A-ED43-8F05-4BF91A134D44}"/>
               </a:ext>
             </a:extLst>
           </p:cNvPr>
@@ -13785,10 +13653,10 @@
       </p:sp>
       <p:pic>
         <p:nvPicPr>
-          <p:cNvPr id="54" name="Graphic 23">
+          <p:cNvPr id="153" name="Graphic 23">
             <a:extLst>
               <a:ext uri="{FF2B5EF4-FFF2-40B4-BE49-F238E27FC236}">
-                <a16:creationId xmlns:a16="http://schemas.microsoft.com/office/drawing/2014/main" id="{7F7974A6-7452-C140-9158-0C631B8B643C}"/>
+                <a16:creationId xmlns:a16="http://schemas.microsoft.com/office/drawing/2014/main" id="{0AC08EAE-0428-7B41-B9EB-F0BAC71B8981}"/>
               </a:ext>
             </a:extLst>
           </p:cNvPr>
@@ -13798,7 +13666,7 @@
           <p:nvPr/>
         </p:nvPicPr>
         <p:blipFill>
-          <a:blip r:embed="rId7">
+          <a:blip r:embed="rId6">
             <a:extLst>
               <a:ext uri="{28A0092B-C50C-407E-A947-70E740481C1C}">
                 <a14:useLocalDpi xmlns:a14="http://schemas.microsoft.com/office/drawing/2010/main" val="0"/>
@@ -13845,10 +13713,10 @@
       </p:pic>
       <p:sp>
         <p:nvSpPr>
-          <p:cNvPr id="55" name="Rectangle 54">
+          <p:cNvPr id="154" name="Rectangle 153">
             <a:extLst>
               <a:ext uri="{FF2B5EF4-FFF2-40B4-BE49-F238E27FC236}">
-                <a16:creationId xmlns:a16="http://schemas.microsoft.com/office/drawing/2014/main" id="{27DA0BF8-0422-6649-A820-21DA7A524A54}"/>
+                <a16:creationId xmlns:a16="http://schemas.microsoft.com/office/drawing/2014/main" id="{B286D8F7-81BE-4443-8C2C-2C2C1F25DAF2}"/>
               </a:ext>
             </a:extLst>
           </p:cNvPr>
@@ -13858,7 +13726,7 @@
         <p:spPr>
           <a:xfrm>
             <a:off x="4003559" y="2020076"/>
-            <a:ext cx="1054444" cy="311130"/>
+            <a:ext cx="1054444" cy="209456"/>
           </a:xfrm>
           <a:prstGeom prst="rect">
             <a:avLst/>
@@ -13899,79 +13767,23 @@
               </a:spcAft>
               <a:defRPr/>
             </a:pPr>
-            <a:r>
-              <a:rPr lang="en-US" sz="600" dirty="0">
-                <a:ln w="0"/>
-                <a:solidFill>
-                  <a:srgbClr val="D86613"/>
-                </a:solidFill>
-                <a:latin typeface="Arial" panose="020B0604020202020204" pitchFamily="34" charset="0"/>
-                <a:cs typeface="Arial" panose="020B0604020202020204" pitchFamily="34" charset="0"/>
-              </a:rPr>
-              <a:t>Bastion Instance</a:t>
-            </a:r>
-          </a:p>
-        </p:txBody>
-      </p:sp>
-      <p:sp>
-        <p:nvSpPr>
-          <p:cNvPr id="68" name="Rectangle 67">
-            <a:extLst>
-              <a:ext uri="{FF2B5EF4-FFF2-40B4-BE49-F238E27FC236}">
-                <a16:creationId xmlns:a16="http://schemas.microsoft.com/office/drawing/2014/main" id="{C03CB8F9-36AD-9943-B335-2EF92FEF9EBA}"/>
-              </a:ext>
-            </a:extLst>
-          </p:cNvPr>
-          <p:cNvSpPr/>
-          <p:nvPr/>
-        </p:nvSpPr>
-        <p:spPr>
-          <a:xfrm>
-            <a:off x="3995126" y="2011555"/>
-            <a:ext cx="1061269" cy="319651"/>
-          </a:xfrm>
-          <a:prstGeom prst="rect">
-            <a:avLst/>
-          </a:prstGeom>
-          <a:solidFill>
-            <a:schemeClr val="bg1">
-              <a:alpha val="66000"/>
-            </a:schemeClr>
-          </a:solidFill>
-          <a:ln>
-            <a:noFill/>
-          </a:ln>
-          <a:effectLst/>
-        </p:spPr>
-        <p:style>
-          <a:lnRef idx="1">
-            <a:schemeClr val="accent1"/>
-          </a:lnRef>
-          <a:fillRef idx="3">
-            <a:schemeClr val="accent1"/>
-          </a:fillRef>
-          <a:effectRef idx="2">
-            <a:schemeClr val="accent1"/>
-          </a:effectRef>
-          <a:fontRef idx="minor">
-            <a:schemeClr val="lt1"/>
-          </a:fontRef>
-        </p:style>
-        <p:txBody>
-          <a:bodyPr rtlCol="0" anchor="ctr"/>
-          <a:lstStyle/>
-          <a:p>
-            <a:pPr algn="ctr"/>
-            <a:endParaRPr lang="en-CN" sz="1100" dirty="0"/>
+            <a:endParaRPr lang="en-US" sz="600" dirty="0">
+              <a:ln w="0"/>
+              <a:solidFill>
+                <a:srgbClr val="D86613"/>
+              </a:solidFill>
+              <a:latin typeface="Arial" panose="020B0604020202020204" pitchFamily="34" charset="0"/>
+              <a:cs typeface="Arial" panose="020B0604020202020204" pitchFamily="34" charset="0"/>
+            </a:endParaRPr>
           </a:p>
         </p:txBody>
       </p:sp>
       <p:pic>
         <p:nvPicPr>
-          <p:cNvPr id="72" name="Graphic 6">
+          <p:cNvPr id="155" name="Graphic 6">
             <a:extLst>
               <a:ext uri="{FF2B5EF4-FFF2-40B4-BE49-F238E27FC236}">
-                <a16:creationId xmlns:a16="http://schemas.microsoft.com/office/drawing/2014/main" id="{08FCB743-999F-C44D-9ED8-6E86243C658E}"/>
+                <a16:creationId xmlns:a16="http://schemas.microsoft.com/office/drawing/2014/main" id="{70430FDC-FE93-5C4C-B29D-6E7E6A08F092}"/>
               </a:ext>
             </a:extLst>
           </p:cNvPr>
@@ -13981,7 +13793,7 @@
           <p:nvPr/>
         </p:nvPicPr>
         <p:blipFill>
-          <a:blip r:embed="rId9"/>
+          <a:blip r:embed="rId8"/>
           <a:srcRect/>
           <a:stretch/>
         </p:blipFill>
@@ -14020,10 +13832,10 @@
       </p:pic>
       <p:sp>
         <p:nvSpPr>
-          <p:cNvPr id="73" name="TextBox 12">
+          <p:cNvPr id="156" name="TextBox 12">
             <a:extLst>
               <a:ext uri="{FF2B5EF4-FFF2-40B4-BE49-F238E27FC236}">
-                <a16:creationId xmlns:a16="http://schemas.microsoft.com/office/drawing/2014/main" id="{26C2B822-E76A-634D-BE91-CD6DB79AC011}"/>
+                <a16:creationId xmlns:a16="http://schemas.microsoft.com/office/drawing/2014/main" id="{52C5695A-BEEB-0441-92BF-1C2E5DC71ED1}"/>
               </a:ext>
             </a:extLst>
           </p:cNvPr>
@@ -14181,17 +13993,17 @@
       </p:sp>
       <p:cxnSp>
         <p:nvCxnSpPr>
-          <p:cNvPr id="78" name="Straight Arrow Connector 64">
+          <p:cNvPr id="157" name="Straight Arrow Connector 64">
             <a:extLst>
               <a:ext uri="{FF2B5EF4-FFF2-40B4-BE49-F238E27FC236}">
-                <a16:creationId xmlns:a16="http://schemas.microsoft.com/office/drawing/2014/main" id="{5476EF28-E203-0146-91F1-8ABF8191E29B}"/>
+                <a16:creationId xmlns:a16="http://schemas.microsoft.com/office/drawing/2014/main" id="{FD97C94F-5678-8C40-B0E5-975582EF2C63}"/>
               </a:ext>
             </a:extLst>
           </p:cNvPr>
           <p:cNvCxnSpPr>
             <a:cxnSpLocks/>
-            <a:stCxn id="72" idx="3"/>
-            <a:endCxn id="62" idx="1"/>
+            <a:stCxn id="155" idx="3"/>
+            <a:endCxn id="200" idx="1"/>
           </p:cNvCxnSpPr>
           <p:nvPr/>
         </p:nvCxnSpPr>
@@ -14230,17 +14042,17 @@
       </p:cxnSp>
       <p:cxnSp>
         <p:nvCxnSpPr>
-          <p:cNvPr id="82" name="Straight Arrow Connector 64">
+          <p:cNvPr id="158" name="Straight Arrow Connector 64">
             <a:extLst>
               <a:ext uri="{FF2B5EF4-FFF2-40B4-BE49-F238E27FC236}">
-                <a16:creationId xmlns:a16="http://schemas.microsoft.com/office/drawing/2014/main" id="{B202A42D-AAEA-3845-AF39-E10D57F0581F}"/>
+                <a16:creationId xmlns:a16="http://schemas.microsoft.com/office/drawing/2014/main" id="{C7ECE2CC-1291-7E41-B554-57CAD60B6A52}"/>
               </a:ext>
             </a:extLst>
           </p:cNvPr>
           <p:cNvCxnSpPr>
             <a:cxnSpLocks/>
-            <a:stCxn id="72" idx="3"/>
-            <a:endCxn id="80" idx="1"/>
+            <a:stCxn id="155" idx="3"/>
+            <a:endCxn id="208" idx="1"/>
           </p:cNvCxnSpPr>
           <p:nvPr/>
         </p:nvCxnSpPr>
@@ -14279,10 +14091,10 @@
       </p:cxnSp>
       <p:sp>
         <p:nvSpPr>
-          <p:cNvPr id="89" name="Rectangle 88">
+          <p:cNvPr id="159" name="Rectangle 158">
             <a:extLst>
               <a:ext uri="{FF2B5EF4-FFF2-40B4-BE49-F238E27FC236}">
-                <a16:creationId xmlns:a16="http://schemas.microsoft.com/office/drawing/2014/main" id="{8B70AD33-C56F-1B49-9477-922B51E487CF}"/>
+                <a16:creationId xmlns:a16="http://schemas.microsoft.com/office/drawing/2014/main" id="{1B413DC3-698C-7E40-BF64-9F1E4B813F6E}"/>
               </a:ext>
             </a:extLst>
           </p:cNvPr>
@@ -14346,10 +14158,10 @@
       </p:sp>
       <p:sp>
         <p:nvSpPr>
-          <p:cNvPr id="99" name="TextBox 98">
+          <p:cNvPr id="160" name="TextBox 159">
             <a:extLst>
               <a:ext uri="{FF2B5EF4-FFF2-40B4-BE49-F238E27FC236}">
-                <a16:creationId xmlns:a16="http://schemas.microsoft.com/office/drawing/2014/main" id="{201B6629-9F93-434F-8D15-9717D41373EB}"/>
+                <a16:creationId xmlns:a16="http://schemas.microsoft.com/office/drawing/2014/main" id="{DC009B1A-7DAA-7D46-93AE-119AD28033A7}"/>
               </a:ext>
             </a:extLst>
           </p:cNvPr>
@@ -14387,10 +14199,10 @@
       </p:sp>
       <p:sp>
         <p:nvSpPr>
-          <p:cNvPr id="108" name="TextBox 107">
+          <p:cNvPr id="161" name="TextBox 160">
             <a:extLst>
               <a:ext uri="{FF2B5EF4-FFF2-40B4-BE49-F238E27FC236}">
-                <a16:creationId xmlns:a16="http://schemas.microsoft.com/office/drawing/2014/main" id="{B0245314-3301-8F47-8589-FDDCACFF5444}"/>
+                <a16:creationId xmlns:a16="http://schemas.microsoft.com/office/drawing/2014/main" id="{8757AB8F-959A-7243-8BE8-D3A71EC406AE}"/>
               </a:ext>
             </a:extLst>
           </p:cNvPr>
@@ -14428,10 +14240,10 @@
       </p:sp>
       <p:pic>
         <p:nvPicPr>
-          <p:cNvPr id="114" name="Graphic 10">
+          <p:cNvPr id="162" name="Graphic 10">
             <a:extLst>
               <a:ext uri="{FF2B5EF4-FFF2-40B4-BE49-F238E27FC236}">
-                <a16:creationId xmlns:a16="http://schemas.microsoft.com/office/drawing/2014/main" id="{8C49F224-3A49-2841-AD74-CC2810792AED}"/>
+                <a16:creationId xmlns:a16="http://schemas.microsoft.com/office/drawing/2014/main" id="{4D1B6430-EFBC-9D45-959C-FA636E30C979}"/>
               </a:ext>
             </a:extLst>
           </p:cNvPr>
@@ -14441,7 +14253,7 @@
           <p:nvPr/>
         </p:nvPicPr>
         <p:blipFill>
-          <a:blip r:embed="rId10">
+          <a:blip r:embed="rId9">
             <a:extLst>
               <a:ext uri="{28A0092B-C50C-407E-A947-70E740481C1C}">
                 <a14:useLocalDpi xmlns:a14="http://schemas.microsoft.com/office/drawing/2010/main" val="0"/>
@@ -14488,10 +14300,10 @@
       </p:pic>
       <p:sp>
         <p:nvSpPr>
-          <p:cNvPr id="115" name="TextBox 12">
+          <p:cNvPr id="163" name="TextBox 12">
             <a:extLst>
               <a:ext uri="{FF2B5EF4-FFF2-40B4-BE49-F238E27FC236}">
-                <a16:creationId xmlns:a16="http://schemas.microsoft.com/office/drawing/2014/main" id="{84EB5BCC-920F-6146-B300-C1C9F6A2C517}"/>
+                <a16:creationId xmlns:a16="http://schemas.microsoft.com/office/drawing/2014/main" id="{EA3E1EE9-0AD9-6C44-8181-CC230F68FF1B}"/>
               </a:ext>
             </a:extLst>
           </p:cNvPr>
@@ -14649,10 +14461,10 @@
       </p:sp>
       <p:pic>
         <p:nvPicPr>
-          <p:cNvPr id="128" name="Graphic 17">
+          <p:cNvPr id="164" name="Graphic 17">
             <a:extLst>
               <a:ext uri="{FF2B5EF4-FFF2-40B4-BE49-F238E27FC236}">
-                <a16:creationId xmlns:a16="http://schemas.microsoft.com/office/drawing/2014/main" id="{B50F1831-1F29-CB45-9C2A-AFAFA817BFF5}"/>
+                <a16:creationId xmlns:a16="http://schemas.microsoft.com/office/drawing/2014/main" id="{4EEC7544-B7E3-A146-873D-9BDCE5FD0689}"/>
               </a:ext>
             </a:extLst>
           </p:cNvPr>
@@ -14662,7 +14474,7 @@
           <p:nvPr/>
         </p:nvPicPr>
         <p:blipFill>
-          <a:blip r:embed="rId11">
+          <a:blip r:embed="rId10">
             <a:extLst>
               <a:ext uri="{28A0092B-C50C-407E-A947-70E740481C1C}">
                 <a14:useLocalDpi xmlns:a14="http://schemas.microsoft.com/office/drawing/2010/main" val="0"/>
@@ -14709,10 +14521,10 @@
       </p:pic>
       <p:sp>
         <p:nvSpPr>
-          <p:cNvPr id="129" name="TextBox 12">
+          <p:cNvPr id="165" name="TextBox 12">
             <a:extLst>
               <a:ext uri="{FF2B5EF4-FFF2-40B4-BE49-F238E27FC236}">
-                <a16:creationId xmlns:a16="http://schemas.microsoft.com/office/drawing/2014/main" id="{3CD910A5-0992-BC4E-93CC-AA5C1002B767}"/>
+                <a16:creationId xmlns:a16="http://schemas.microsoft.com/office/drawing/2014/main" id="{BF20448B-42F7-8143-A32D-5273594CE98B}"/>
               </a:ext>
             </a:extLst>
           </p:cNvPr>
@@ -14870,10 +14682,10 @@
       </p:sp>
       <p:pic>
         <p:nvPicPr>
-          <p:cNvPr id="130" name="Graphic 8">
+          <p:cNvPr id="166" name="Graphic 8">
             <a:extLst>
               <a:ext uri="{FF2B5EF4-FFF2-40B4-BE49-F238E27FC236}">
-                <a16:creationId xmlns:a16="http://schemas.microsoft.com/office/drawing/2014/main" id="{EA8EB315-C7EB-4248-9F77-F90D5489E5B1}"/>
+                <a16:creationId xmlns:a16="http://schemas.microsoft.com/office/drawing/2014/main" id="{0898F8EF-14D3-A344-A051-F73ECCBF4AD9}"/>
               </a:ext>
             </a:extLst>
           </p:cNvPr>
@@ -14883,7 +14695,7 @@
           <p:nvPr/>
         </p:nvPicPr>
         <p:blipFill>
-          <a:blip r:embed="rId12">
+          <a:blip r:embed="rId11">
             <a:extLst>
               <a:ext uri="{28A0092B-C50C-407E-A947-70E740481C1C}">
                 <a14:useLocalDpi xmlns:a14="http://schemas.microsoft.com/office/drawing/2010/main" val="0"/>
@@ -14930,10 +14742,10 @@
       </p:pic>
       <p:sp>
         <p:nvSpPr>
-          <p:cNvPr id="131" name="TextBox 12">
+          <p:cNvPr id="167" name="TextBox 12">
             <a:extLst>
               <a:ext uri="{FF2B5EF4-FFF2-40B4-BE49-F238E27FC236}">
-                <a16:creationId xmlns:a16="http://schemas.microsoft.com/office/drawing/2014/main" id="{E976DCDF-9C9F-3441-B823-E292DE24EC0A}"/>
+                <a16:creationId xmlns:a16="http://schemas.microsoft.com/office/drawing/2014/main" id="{84C1136F-EEFD-5142-88AD-87E22D0E6DAE}"/>
               </a:ext>
             </a:extLst>
           </p:cNvPr>
@@ -15102,10 +14914,10 @@
       </p:sp>
       <p:pic>
         <p:nvPicPr>
-          <p:cNvPr id="91" name="Graphic 24">
+          <p:cNvPr id="168" name="Graphic 24">
             <a:extLst>
               <a:ext uri="{FF2B5EF4-FFF2-40B4-BE49-F238E27FC236}">
-                <a16:creationId xmlns:a16="http://schemas.microsoft.com/office/drawing/2014/main" id="{76593A42-B2E0-9040-A82F-3E3A2AD0889F}"/>
+                <a16:creationId xmlns:a16="http://schemas.microsoft.com/office/drawing/2014/main" id="{623DC96F-056A-9943-9986-A10F099F9769}"/>
               </a:ext>
             </a:extLst>
           </p:cNvPr>
@@ -15115,7 +14927,7 @@
           <p:nvPr/>
         </p:nvPicPr>
         <p:blipFill>
-          <a:blip r:embed="rId13">
+          <a:blip r:embed="rId12">
             <a:extLst>
               <a:ext uri="{28A0092B-C50C-407E-A947-70E740481C1C}">
                 <a14:useLocalDpi xmlns:a14="http://schemas.microsoft.com/office/drawing/2010/main" val="0"/>
@@ -15162,10 +14974,10 @@
       </p:pic>
       <p:sp>
         <p:nvSpPr>
-          <p:cNvPr id="92" name="TextBox 9">
+          <p:cNvPr id="169" name="TextBox 9">
             <a:extLst>
               <a:ext uri="{FF2B5EF4-FFF2-40B4-BE49-F238E27FC236}">
-                <a16:creationId xmlns:a16="http://schemas.microsoft.com/office/drawing/2014/main" id="{4E319B1D-2A3D-0142-B7D9-D0B1ED190D1B}"/>
+                <a16:creationId xmlns:a16="http://schemas.microsoft.com/office/drawing/2014/main" id="{CFB7EE1E-D770-AA4F-8B82-7D48B47EF948}"/>
               </a:ext>
             </a:extLst>
           </p:cNvPr>
@@ -15323,10 +15135,10 @@
       </p:sp>
       <p:pic>
         <p:nvPicPr>
-          <p:cNvPr id="93" name="Graphic 15">
+          <p:cNvPr id="170" name="Graphic 15">
             <a:extLst>
               <a:ext uri="{FF2B5EF4-FFF2-40B4-BE49-F238E27FC236}">
-                <a16:creationId xmlns:a16="http://schemas.microsoft.com/office/drawing/2014/main" id="{78054149-9A97-C24A-85EE-ADF0E0B5827B}"/>
+                <a16:creationId xmlns:a16="http://schemas.microsoft.com/office/drawing/2014/main" id="{80F2F47F-3593-9A4F-897D-0527B9F46EC6}"/>
               </a:ext>
             </a:extLst>
           </p:cNvPr>
@@ -15336,7 +15148,7 @@
           <p:nvPr/>
         </p:nvPicPr>
         <p:blipFill>
-          <a:blip r:embed="rId14">
+          <a:blip r:embed="rId13">
             <a:extLst>
               <a:ext uri="{28A0092B-C50C-407E-A947-70E740481C1C}">
                 <a14:useLocalDpi xmlns:a14="http://schemas.microsoft.com/office/drawing/2010/main" val="0"/>
@@ -15383,10 +15195,10 @@
       </p:pic>
       <p:sp>
         <p:nvSpPr>
-          <p:cNvPr id="94" name="TextBox 16">
+          <p:cNvPr id="171" name="TextBox 16">
             <a:extLst>
               <a:ext uri="{FF2B5EF4-FFF2-40B4-BE49-F238E27FC236}">
-                <a16:creationId xmlns:a16="http://schemas.microsoft.com/office/drawing/2014/main" id="{D6473597-6A3E-DB4F-A7F1-B2857E0D34A5}"/>
+                <a16:creationId xmlns:a16="http://schemas.microsoft.com/office/drawing/2014/main" id="{A3EEC92E-BBB1-CA48-A249-64021B5010DF}"/>
               </a:ext>
             </a:extLst>
           </p:cNvPr>
@@ -15546,10 +15358,10 @@
       </p:sp>
       <p:pic>
         <p:nvPicPr>
-          <p:cNvPr id="95" name="Graphic 15">
+          <p:cNvPr id="172" name="Graphic 15">
             <a:extLst>
               <a:ext uri="{FF2B5EF4-FFF2-40B4-BE49-F238E27FC236}">
-                <a16:creationId xmlns:a16="http://schemas.microsoft.com/office/drawing/2014/main" id="{C9E912E9-88D2-454F-91C1-F93D5D923F5B}"/>
+                <a16:creationId xmlns:a16="http://schemas.microsoft.com/office/drawing/2014/main" id="{51E00430-AA7F-BC4E-97A0-F85C084F5FE8}"/>
               </a:ext>
             </a:extLst>
           </p:cNvPr>
@@ -15559,7 +15371,7 @@
           <p:nvPr/>
         </p:nvPicPr>
         <p:blipFill>
-          <a:blip r:embed="rId14">
+          <a:blip r:embed="rId13">
             <a:extLst>
               <a:ext uri="{28A0092B-C50C-407E-A947-70E740481C1C}">
                 <a14:useLocalDpi xmlns:a14="http://schemas.microsoft.com/office/drawing/2010/main" val="0"/>
@@ -15606,10 +15418,10 @@
       </p:pic>
       <p:sp>
         <p:nvSpPr>
-          <p:cNvPr id="96" name="TextBox 16">
+          <p:cNvPr id="173" name="TextBox 16">
             <a:extLst>
               <a:ext uri="{FF2B5EF4-FFF2-40B4-BE49-F238E27FC236}">
-                <a16:creationId xmlns:a16="http://schemas.microsoft.com/office/drawing/2014/main" id="{6454DAED-E20B-3949-87D8-A5625DD84DF3}"/>
+                <a16:creationId xmlns:a16="http://schemas.microsoft.com/office/drawing/2014/main" id="{B0952E60-3269-1247-98B1-3E08467731AA}"/>
               </a:ext>
             </a:extLst>
           </p:cNvPr>
@@ -15769,10 +15581,10 @@
       </p:sp>
       <p:sp>
         <p:nvSpPr>
-          <p:cNvPr id="19" name="TextBox 18">
+          <p:cNvPr id="174" name="TextBox 173">
             <a:extLst>
               <a:ext uri="{FF2B5EF4-FFF2-40B4-BE49-F238E27FC236}">
-                <a16:creationId xmlns:a16="http://schemas.microsoft.com/office/drawing/2014/main" id="{487E3E26-492C-1843-A23A-17C9E1C9EFDE}"/>
+                <a16:creationId xmlns:a16="http://schemas.microsoft.com/office/drawing/2014/main" id="{096FAA64-7AC1-2D4F-9997-56DB1CEADCB7}"/>
               </a:ext>
             </a:extLst>
           </p:cNvPr>
@@ -15781,7 +15593,7 @@
         </p:nvSpPr>
         <p:spPr>
           <a:xfrm>
-            <a:off x="746662" y="1409248"/>
+            <a:off x="729570" y="1306696"/>
             <a:ext cx="343364" cy="184666"/>
           </a:xfrm>
           <a:prstGeom prst="rect">
@@ -15810,10 +15622,10 @@
       </p:sp>
       <p:sp>
         <p:nvSpPr>
-          <p:cNvPr id="97" name="TextBox 12">
+          <p:cNvPr id="175" name="TextBox 12">
             <a:extLst>
               <a:ext uri="{FF2B5EF4-FFF2-40B4-BE49-F238E27FC236}">
-                <a16:creationId xmlns:a16="http://schemas.microsoft.com/office/drawing/2014/main" id="{6088DE4E-1FB7-C549-B9E4-939B36EEAEAE}"/>
+                <a16:creationId xmlns:a16="http://schemas.microsoft.com/office/drawing/2014/main" id="{7BF5357A-7F68-A947-B62C-36D729108560}"/>
               </a:ext>
             </a:extLst>
           </p:cNvPr>
@@ -15824,8 +15636,8 @@
         </p:nvSpPr>
         <p:spPr bwMode="auto">
           <a:xfrm>
-            <a:off x="626765" y="1015411"/>
-            <a:ext cx="614774" cy="184666"/>
+            <a:off x="536250" y="1015411"/>
+            <a:ext cx="852873" cy="184666"/>
           </a:xfrm>
           <a:prstGeom prst="rect">
             <a:avLst/>
@@ -15964,17 +15776,17 @@
                 <a:ea typeface="Amazon Ember" panose="020B0603020204020204" pitchFamily="34" charset="0"/>
                 <a:cs typeface="Arial" panose="020B0604020202020204" pitchFamily="34" charset="0"/>
               </a:rPr>
-              <a:t>AWS Cloud</a:t>
+              <a:t>Amazon Cloud</a:t>
             </a:r>
           </a:p>
         </p:txBody>
       </p:sp>
       <p:pic>
         <p:nvPicPr>
-          <p:cNvPr id="107" name="Graphic 6">
+          <p:cNvPr id="176" name="Graphic 6">
             <a:extLst>
               <a:ext uri="{FF2B5EF4-FFF2-40B4-BE49-F238E27FC236}">
-                <a16:creationId xmlns:a16="http://schemas.microsoft.com/office/drawing/2014/main" id="{2875474C-BEFE-D345-8DB3-EF40F904BADB}"/>
+                <a16:creationId xmlns:a16="http://schemas.microsoft.com/office/drawing/2014/main" id="{CD1C97E2-0729-FA49-8E7F-DA3FBD40C7E2}"/>
               </a:ext>
             </a:extLst>
           </p:cNvPr>
@@ -15984,10 +15796,10 @@
           <p:nvPr/>
         </p:nvPicPr>
         <p:blipFill>
-          <a:blip r:embed="rId15">
+          <a:blip r:embed="rId14">
             <a:extLst>
               <a:ext uri="{96DAC541-7B7A-43D3-8B79-37D633B846F1}">
-                <asvg:svgBlip xmlns:asvg="http://schemas.microsoft.com/office/drawing/2016/SVG/main" r:embed="rId16"/>
+                <asvg:svgBlip xmlns:asvg="http://schemas.microsoft.com/office/drawing/2016/SVG/main" r:embed="rId15"/>
               </a:ext>
             </a:extLst>
           </a:blip>
@@ -16029,10 +15841,10 @@
       </p:pic>
       <p:pic>
         <p:nvPicPr>
-          <p:cNvPr id="110" name="Graphic 22">
+          <p:cNvPr id="177" name="Graphic 22">
             <a:extLst>
               <a:ext uri="{FF2B5EF4-FFF2-40B4-BE49-F238E27FC236}">
-                <a16:creationId xmlns:a16="http://schemas.microsoft.com/office/drawing/2014/main" id="{EA83AD39-1B07-9C44-8AFF-8DF6D6770FAD}"/>
+                <a16:creationId xmlns:a16="http://schemas.microsoft.com/office/drawing/2014/main" id="{065DEC93-F555-3240-8448-93206EAA5E1A}"/>
               </a:ext>
             </a:extLst>
           </p:cNvPr>
@@ -16042,10 +15854,10 @@
           <p:nvPr/>
         </p:nvPicPr>
         <p:blipFill>
-          <a:blip r:embed="rId17">
+          <a:blip r:embed="rId16">
             <a:extLst>
               <a:ext uri="{96DAC541-7B7A-43D3-8B79-37D633B846F1}">
-                <asvg:svgBlip xmlns:asvg="http://schemas.microsoft.com/office/drawing/2016/SVG/main" r:embed="rId18"/>
+                <asvg:svgBlip xmlns:asvg="http://schemas.microsoft.com/office/drawing/2016/SVG/main" r:embed="rId17"/>
               </a:ext>
             </a:extLst>
           </a:blip>
@@ -16054,7 +15866,7 @@
         </p:blipFill>
         <p:spPr bwMode="auto">
           <a:xfrm>
-            <a:off x="82032" y="2047920"/>
+            <a:off x="82032" y="2005190"/>
             <a:ext cx="257176" cy="257176"/>
           </a:xfrm>
           <a:prstGeom prst="rect">
@@ -16087,24 +15899,24 @@
       </p:pic>
       <p:cxnSp>
         <p:nvCxnSpPr>
-          <p:cNvPr id="111" name="Straight Arrow Connector 64">
+          <p:cNvPr id="178" name="Straight Arrow Connector 64">
             <a:extLst>
               <a:ext uri="{FF2B5EF4-FFF2-40B4-BE49-F238E27FC236}">
-                <a16:creationId xmlns:a16="http://schemas.microsoft.com/office/drawing/2014/main" id="{B8BC61F6-EB69-A04B-8ADE-26C3623B1587}"/>
+                <a16:creationId xmlns:a16="http://schemas.microsoft.com/office/drawing/2014/main" id="{BDB20BB0-C03E-C546-8708-8C56C9469A0F}"/>
               </a:ext>
             </a:extLst>
           </p:cNvPr>
           <p:cNvCxnSpPr>
             <a:cxnSpLocks/>
-            <a:stCxn id="110" idx="3"/>
-            <a:endCxn id="69" idx="1"/>
+            <a:stCxn id="177" idx="3"/>
+            <a:endCxn id="150" idx="1"/>
           </p:cNvCxnSpPr>
           <p:nvPr/>
         </p:nvCxnSpPr>
         <p:spPr>
           <a:xfrm>
-            <a:off x="339208" y="2176508"/>
-            <a:ext cx="1179775" cy="8458"/>
+            <a:off x="339208" y="2133778"/>
+            <a:ext cx="1179775" cy="5939"/>
           </a:xfrm>
           <a:prstGeom prst="straightConnector1">
             <a:avLst/>
@@ -16134,10 +15946,10 @@
       </p:cxnSp>
       <p:sp>
         <p:nvSpPr>
-          <p:cNvPr id="112" name="TextBox 12">
+          <p:cNvPr id="179" name="TextBox 12">
             <a:extLst>
               <a:ext uri="{FF2B5EF4-FFF2-40B4-BE49-F238E27FC236}">
-                <a16:creationId xmlns:a16="http://schemas.microsoft.com/office/drawing/2014/main" id="{BF6374F9-21F0-E843-BE33-393C3EC80CA7}"/>
+                <a16:creationId xmlns:a16="http://schemas.microsoft.com/office/drawing/2014/main" id="{4E9DBF8C-4757-8E48-8CA9-D01245AF919D}"/>
               </a:ext>
             </a:extLst>
           </p:cNvPr>
@@ -16295,10 +16107,10 @@
       </p:sp>
       <p:sp>
         <p:nvSpPr>
-          <p:cNvPr id="113" name="TextBox 12">
+          <p:cNvPr id="180" name="TextBox 12">
             <a:extLst>
               <a:ext uri="{FF2B5EF4-FFF2-40B4-BE49-F238E27FC236}">
-                <a16:creationId xmlns:a16="http://schemas.microsoft.com/office/drawing/2014/main" id="{26A8D00C-7E7F-DA48-9A4B-F386FD211AB6}"/>
+                <a16:creationId xmlns:a16="http://schemas.microsoft.com/office/drawing/2014/main" id="{64EF85BA-4D8A-0148-B910-0684438197A2}"/>
               </a:ext>
             </a:extLst>
           </p:cNvPr>
@@ -16309,7 +16121,7 @@
         </p:nvSpPr>
         <p:spPr bwMode="auto">
           <a:xfrm>
-            <a:off x="-9897" y="2289002"/>
+            <a:off x="-9897" y="2246272"/>
             <a:ext cx="418497" cy="184666"/>
           </a:xfrm>
           <a:prstGeom prst="rect">
@@ -16456,17 +16268,17 @@
       </p:sp>
       <p:cxnSp>
         <p:nvCxnSpPr>
-          <p:cNvPr id="117" name="Straight Arrow Connector 64">
+          <p:cNvPr id="181" name="Straight Arrow Connector 64">
             <a:extLst>
               <a:ext uri="{FF2B5EF4-FFF2-40B4-BE49-F238E27FC236}">
-                <a16:creationId xmlns:a16="http://schemas.microsoft.com/office/drawing/2014/main" id="{870FF239-04FE-C64F-AA14-476C213F3F7F}"/>
+                <a16:creationId xmlns:a16="http://schemas.microsoft.com/office/drawing/2014/main" id="{DD44E360-F49F-654B-ABFC-FCDB5B1AB84A}"/>
               </a:ext>
             </a:extLst>
           </p:cNvPr>
           <p:cNvCxnSpPr>
             <a:cxnSpLocks/>
-            <a:stCxn id="107" idx="1"/>
-            <a:endCxn id="72" idx="1"/>
+            <a:stCxn id="176" idx="1"/>
+            <a:endCxn id="155" idx="1"/>
           </p:cNvCxnSpPr>
           <p:nvPr/>
         </p:nvCxnSpPr>
@@ -16503,10 +16315,10 @@
       </p:cxnSp>
       <p:sp>
         <p:nvSpPr>
-          <p:cNvPr id="33" name="Rectangle 32">
+          <p:cNvPr id="182" name="Rectangle 181">
             <a:extLst>
               <a:ext uri="{FF2B5EF4-FFF2-40B4-BE49-F238E27FC236}">
-                <a16:creationId xmlns:a16="http://schemas.microsoft.com/office/drawing/2014/main" id="{EE14E10A-7611-1B48-B355-F2FE0CFA8912}"/>
+                <a16:creationId xmlns:a16="http://schemas.microsoft.com/office/drawing/2014/main" id="{EB6D51CF-D4A4-DA4B-B430-94C93269BA93}"/>
               </a:ext>
             </a:extLst>
           </p:cNvPr>
@@ -16557,10 +16369,10 @@
       </p:sp>
       <p:sp>
         <p:nvSpPr>
-          <p:cNvPr id="119" name="Rectangle 118">
+          <p:cNvPr id="183" name="Rectangle 182">
             <a:extLst>
               <a:ext uri="{FF2B5EF4-FFF2-40B4-BE49-F238E27FC236}">
-                <a16:creationId xmlns:a16="http://schemas.microsoft.com/office/drawing/2014/main" id="{481711CA-B2EB-6546-8468-1B043F586FB1}"/>
+                <a16:creationId xmlns:a16="http://schemas.microsoft.com/office/drawing/2014/main" id="{0FE01659-6C24-3E4D-9D43-B88990366FC1}"/>
               </a:ext>
             </a:extLst>
           </p:cNvPr>
@@ -16611,10 +16423,10 @@
       </p:sp>
       <p:sp>
         <p:nvSpPr>
-          <p:cNvPr id="71" name="Rectangle 70">
+          <p:cNvPr id="184" name="Rectangle 183">
             <a:extLst>
               <a:ext uri="{FF2B5EF4-FFF2-40B4-BE49-F238E27FC236}">
-                <a16:creationId xmlns:a16="http://schemas.microsoft.com/office/drawing/2014/main" id="{57EB6F4E-8667-D34C-B2C9-74BF5F42BF1E}"/>
+                <a16:creationId xmlns:a16="http://schemas.microsoft.com/office/drawing/2014/main" id="{3F83F6AD-9120-884B-8F3D-6006E62FAE26}"/>
               </a:ext>
             </a:extLst>
           </p:cNvPr>
@@ -16678,10 +16490,10 @@
       </p:sp>
       <p:pic>
         <p:nvPicPr>
-          <p:cNvPr id="74" name="Graphic 23">
+          <p:cNvPr id="185" name="Graphic 23">
             <a:extLst>
               <a:ext uri="{FF2B5EF4-FFF2-40B4-BE49-F238E27FC236}">
-                <a16:creationId xmlns:a16="http://schemas.microsoft.com/office/drawing/2014/main" id="{788CC288-0171-5B4B-A5E7-D93D223E9BE9}"/>
+                <a16:creationId xmlns:a16="http://schemas.microsoft.com/office/drawing/2014/main" id="{BA92AF6F-694F-9F4B-AB82-B3E0B101A472}"/>
               </a:ext>
             </a:extLst>
           </p:cNvPr>
@@ -16691,7 +16503,7 @@
           <p:nvPr/>
         </p:nvPicPr>
         <p:blipFill>
-          <a:blip r:embed="rId7">
+          <a:blip r:embed="rId6">
             <a:extLst>
               <a:ext uri="{28A0092B-C50C-407E-A947-70E740481C1C}">
                 <a14:useLocalDpi xmlns:a14="http://schemas.microsoft.com/office/drawing/2010/main" val="0"/>
@@ -16738,10 +16550,10 @@
       </p:pic>
       <p:grpSp>
         <p:nvGrpSpPr>
-          <p:cNvPr id="10" name="Group 9">
+          <p:cNvPr id="186" name="Group 185">
             <a:extLst>
               <a:ext uri="{FF2B5EF4-FFF2-40B4-BE49-F238E27FC236}">
-                <a16:creationId xmlns:a16="http://schemas.microsoft.com/office/drawing/2014/main" id="{28511E28-48AD-7547-B87A-BB048DF8572F}"/>
+                <a16:creationId xmlns:a16="http://schemas.microsoft.com/office/drawing/2014/main" id="{98FCE14F-1A0B-4F4C-89FA-A7C8C9C87E9E}"/>
               </a:ext>
             </a:extLst>
           </p:cNvPr>
@@ -16758,10 +16570,10 @@
         </p:grpSpPr>
         <p:pic>
           <p:nvPicPr>
-            <p:cNvPr id="85" name="Graphic 23">
+            <p:cNvPr id="187" name="Graphic 23">
               <a:extLst>
                 <a:ext uri="{FF2B5EF4-FFF2-40B4-BE49-F238E27FC236}">
-                  <a16:creationId xmlns:a16="http://schemas.microsoft.com/office/drawing/2014/main" id="{1982975B-84A1-B64E-82E1-DEABF763ADE5}"/>
+                  <a16:creationId xmlns:a16="http://schemas.microsoft.com/office/drawing/2014/main" id="{E60F789C-E69E-C240-8E8C-2D34324A9C54}"/>
                 </a:ext>
               </a:extLst>
             </p:cNvPr>
@@ -16771,7 +16583,7 @@
             <p:nvPr/>
           </p:nvPicPr>
           <p:blipFill>
-            <a:blip r:embed="rId7">
+            <a:blip r:embed="rId6">
               <a:extLst>
                 <a:ext uri="{28A0092B-C50C-407E-A947-70E740481C1C}">
                   <a14:useLocalDpi xmlns:a14="http://schemas.microsoft.com/office/drawing/2010/main" val="0"/>
@@ -16818,10 +16630,10 @@
         </p:pic>
         <p:sp>
           <p:nvSpPr>
-            <p:cNvPr id="86" name="Rectangle 85">
+            <p:cNvPr id="188" name="Rectangle 187">
               <a:extLst>
                 <a:ext uri="{FF2B5EF4-FFF2-40B4-BE49-F238E27FC236}">
-                  <a16:creationId xmlns:a16="http://schemas.microsoft.com/office/drawing/2014/main" id="{0930EE80-89CF-1C44-A290-8D23EDF9B2AA}"/>
+                  <a16:creationId xmlns:a16="http://schemas.microsoft.com/office/drawing/2014/main" id="{A81F9A34-9CCB-1348-86F4-5BDF50A67CC1}"/>
                 </a:ext>
               </a:extLst>
             </p:cNvPr>
@@ -16885,10 +16697,10 @@
         </p:sp>
         <p:sp>
           <p:nvSpPr>
-            <p:cNvPr id="3" name="TextBox 2">
+            <p:cNvPr id="189" name="TextBox 188">
               <a:extLst>
                 <a:ext uri="{FF2B5EF4-FFF2-40B4-BE49-F238E27FC236}">
-                  <a16:creationId xmlns:a16="http://schemas.microsoft.com/office/drawing/2014/main" id="{909B3500-AF49-6B49-89DA-257264B1DFC3}"/>
+                  <a16:creationId xmlns:a16="http://schemas.microsoft.com/office/drawing/2014/main" id="{249B7B80-A3EF-3E48-B7F5-797FE8E20802}"/>
                 </a:ext>
               </a:extLst>
             </p:cNvPr>
@@ -16931,10 +16743,10 @@
       </p:grpSp>
       <p:grpSp>
         <p:nvGrpSpPr>
-          <p:cNvPr id="5" name="Group 4">
+          <p:cNvPr id="190" name="Group 189">
             <a:extLst>
               <a:ext uri="{FF2B5EF4-FFF2-40B4-BE49-F238E27FC236}">
-                <a16:creationId xmlns:a16="http://schemas.microsoft.com/office/drawing/2014/main" id="{0FD6B47F-14AC-3849-91F2-32E8E2667BFC}"/>
+                <a16:creationId xmlns:a16="http://schemas.microsoft.com/office/drawing/2014/main" id="{D9ACA3E7-0D53-A041-BD03-B93A400B451A}"/>
               </a:ext>
             </a:extLst>
           </p:cNvPr>
@@ -16951,10 +16763,10 @@
         </p:grpSpPr>
         <p:pic>
           <p:nvPicPr>
-            <p:cNvPr id="76" name="Graphic 23">
+            <p:cNvPr id="191" name="Graphic 23">
               <a:extLst>
                 <a:ext uri="{FF2B5EF4-FFF2-40B4-BE49-F238E27FC236}">
-                  <a16:creationId xmlns:a16="http://schemas.microsoft.com/office/drawing/2014/main" id="{FF0897C2-D403-8F48-B8FE-ED1DA105FC6E}"/>
+                  <a16:creationId xmlns:a16="http://schemas.microsoft.com/office/drawing/2014/main" id="{64E396B0-6309-BB48-AF29-198E1E0E6ADD}"/>
                 </a:ext>
               </a:extLst>
             </p:cNvPr>
@@ -16964,7 +16776,7 @@
             <p:nvPr/>
           </p:nvPicPr>
           <p:blipFill>
-            <a:blip r:embed="rId7">
+            <a:blip r:embed="rId6">
               <a:extLst>
                 <a:ext uri="{28A0092B-C50C-407E-A947-70E740481C1C}">
                   <a14:useLocalDpi xmlns:a14="http://schemas.microsoft.com/office/drawing/2010/main" val="0"/>
@@ -17011,10 +16823,10 @@
         </p:pic>
         <p:sp>
           <p:nvSpPr>
-            <p:cNvPr id="77" name="Rectangle 76">
+            <p:cNvPr id="192" name="Rectangle 191">
               <a:extLst>
                 <a:ext uri="{FF2B5EF4-FFF2-40B4-BE49-F238E27FC236}">
-                  <a16:creationId xmlns:a16="http://schemas.microsoft.com/office/drawing/2014/main" id="{313C7F24-1725-584A-A397-A82435C443B8}"/>
+                  <a16:creationId xmlns:a16="http://schemas.microsoft.com/office/drawing/2014/main" id="{37F11A04-1D86-8D44-9B68-4194FCFC6A21}"/>
                 </a:ext>
               </a:extLst>
             </p:cNvPr>
@@ -17078,10 +16890,10 @@
         </p:sp>
         <p:sp>
           <p:nvSpPr>
-            <p:cNvPr id="75" name="TextBox 74">
+            <p:cNvPr id="193" name="TextBox 192">
               <a:extLst>
                 <a:ext uri="{FF2B5EF4-FFF2-40B4-BE49-F238E27FC236}">
-                  <a16:creationId xmlns:a16="http://schemas.microsoft.com/office/drawing/2014/main" id="{7CB7A3CE-94DE-B14E-9320-9363EDA69B99}"/>
+                  <a16:creationId xmlns:a16="http://schemas.microsoft.com/office/drawing/2014/main" id="{F18606CF-CAF2-5E49-9C5A-934AF04E8A83}"/>
                 </a:ext>
               </a:extLst>
             </p:cNvPr>
@@ -17124,10 +16936,10 @@
       </p:grpSp>
       <p:grpSp>
         <p:nvGrpSpPr>
-          <p:cNvPr id="4" name="Group 3">
+          <p:cNvPr id="194" name="Group 193">
             <a:extLst>
               <a:ext uri="{FF2B5EF4-FFF2-40B4-BE49-F238E27FC236}">
-                <a16:creationId xmlns:a16="http://schemas.microsoft.com/office/drawing/2014/main" id="{8E9CCB33-BE61-294D-829B-792A77A4B54A}"/>
+                <a16:creationId xmlns:a16="http://schemas.microsoft.com/office/drawing/2014/main" id="{D3306F3D-3C1E-EF46-AB21-ECBAAF1BB0D3}"/>
               </a:ext>
             </a:extLst>
           </p:cNvPr>
@@ -17144,10 +16956,10 @@
         </p:grpSpPr>
         <p:pic>
           <p:nvPicPr>
-            <p:cNvPr id="87" name="Graphic 23">
+            <p:cNvPr id="195" name="Graphic 23">
               <a:extLst>
                 <a:ext uri="{FF2B5EF4-FFF2-40B4-BE49-F238E27FC236}">
-                  <a16:creationId xmlns:a16="http://schemas.microsoft.com/office/drawing/2014/main" id="{8FCBCD63-66DE-454E-9332-06142A306CE6}"/>
+                  <a16:creationId xmlns:a16="http://schemas.microsoft.com/office/drawing/2014/main" id="{A65BE1C1-63A0-404A-89A7-CF7D6413300A}"/>
                 </a:ext>
               </a:extLst>
             </p:cNvPr>
@@ -17157,7 +16969,7 @@
             <p:nvPr/>
           </p:nvPicPr>
           <p:blipFill>
-            <a:blip r:embed="rId7">
+            <a:blip r:embed="rId6">
               <a:extLst>
                 <a:ext uri="{28A0092B-C50C-407E-A947-70E740481C1C}">
                   <a14:useLocalDpi xmlns:a14="http://schemas.microsoft.com/office/drawing/2010/main" val="0"/>
@@ -17204,10 +17016,10 @@
         </p:pic>
         <p:sp>
           <p:nvSpPr>
-            <p:cNvPr id="88" name="Rectangle 87">
+            <p:cNvPr id="196" name="Rectangle 195">
               <a:extLst>
                 <a:ext uri="{FF2B5EF4-FFF2-40B4-BE49-F238E27FC236}">
-                  <a16:creationId xmlns:a16="http://schemas.microsoft.com/office/drawing/2014/main" id="{509BB2A1-B191-F449-84EA-9D8F004234EB}"/>
+                  <a16:creationId xmlns:a16="http://schemas.microsoft.com/office/drawing/2014/main" id="{8AA29894-8AFD-C642-9266-61101A748E89}"/>
                 </a:ext>
               </a:extLst>
             </p:cNvPr>
@@ -17271,10 +17083,10 @@
         </p:sp>
         <p:sp>
           <p:nvSpPr>
-            <p:cNvPr id="84" name="TextBox 83">
+            <p:cNvPr id="197" name="TextBox 196">
               <a:extLst>
                 <a:ext uri="{FF2B5EF4-FFF2-40B4-BE49-F238E27FC236}">
-                  <a16:creationId xmlns:a16="http://schemas.microsoft.com/office/drawing/2014/main" id="{D733CD13-4766-B346-BAC8-EBD72BF8E81F}"/>
+                  <a16:creationId xmlns:a16="http://schemas.microsoft.com/office/drawing/2014/main" id="{E1B4C36C-FFF4-0A45-8D61-B5D72162B0D6}"/>
                 </a:ext>
               </a:extLst>
             </p:cNvPr>
@@ -17317,10 +17129,10 @@
       </p:grpSp>
       <p:grpSp>
         <p:nvGrpSpPr>
-          <p:cNvPr id="18" name="Group 17">
+          <p:cNvPr id="198" name="Group 197">
             <a:extLst>
               <a:ext uri="{FF2B5EF4-FFF2-40B4-BE49-F238E27FC236}">
-                <a16:creationId xmlns:a16="http://schemas.microsoft.com/office/drawing/2014/main" id="{E9FDFCF9-04D9-3A4D-BCE1-47F222647CFC}"/>
+                <a16:creationId xmlns:a16="http://schemas.microsoft.com/office/drawing/2014/main" id="{5A86BC35-A9D5-7845-9278-50A523DCC82C}"/>
               </a:ext>
             </a:extLst>
           </p:cNvPr>
@@ -17337,10 +17149,10 @@
         </p:grpSpPr>
         <p:pic>
           <p:nvPicPr>
-            <p:cNvPr id="61" name="Graphic 23">
+            <p:cNvPr id="199" name="Graphic 23">
               <a:extLst>
                 <a:ext uri="{FF2B5EF4-FFF2-40B4-BE49-F238E27FC236}">
-                  <a16:creationId xmlns:a16="http://schemas.microsoft.com/office/drawing/2014/main" id="{D3BAE4D0-F259-AE45-80E2-719A21CEAD69}"/>
+                  <a16:creationId xmlns:a16="http://schemas.microsoft.com/office/drawing/2014/main" id="{691AE722-93C6-5848-AE92-4B7E943170B1}"/>
                 </a:ext>
               </a:extLst>
             </p:cNvPr>
@@ -17350,7 +17162,7 @@
             <p:nvPr/>
           </p:nvPicPr>
           <p:blipFill>
-            <a:blip r:embed="rId7">
+            <a:blip r:embed="rId6">
               <a:extLst>
                 <a:ext uri="{28A0092B-C50C-407E-A947-70E740481C1C}">
                   <a14:useLocalDpi xmlns:a14="http://schemas.microsoft.com/office/drawing/2010/main" val="0"/>
@@ -17397,10 +17209,10 @@
         </p:pic>
         <p:sp>
           <p:nvSpPr>
-            <p:cNvPr id="62" name="Rectangle 61">
+            <p:cNvPr id="200" name="Rectangle 199">
               <a:extLst>
                 <a:ext uri="{FF2B5EF4-FFF2-40B4-BE49-F238E27FC236}">
-                  <a16:creationId xmlns:a16="http://schemas.microsoft.com/office/drawing/2014/main" id="{3FBE3A0A-9774-F04F-8482-986D7998D286}"/>
+                  <a16:creationId xmlns:a16="http://schemas.microsoft.com/office/drawing/2014/main" id="{CBBA5247-97CD-9E41-9539-2F3D7735ACED}"/>
                 </a:ext>
               </a:extLst>
             </p:cNvPr>
@@ -17464,10 +17276,10 @@
         </p:sp>
         <p:sp>
           <p:nvSpPr>
-            <p:cNvPr id="90" name="TextBox 89">
+            <p:cNvPr id="201" name="TextBox 200">
               <a:extLst>
                 <a:ext uri="{FF2B5EF4-FFF2-40B4-BE49-F238E27FC236}">
-                  <a16:creationId xmlns:a16="http://schemas.microsoft.com/office/drawing/2014/main" id="{C4D1F2A3-6A6D-C946-A8BC-6CA5D63EF71E}"/>
+                  <a16:creationId xmlns:a16="http://schemas.microsoft.com/office/drawing/2014/main" id="{B7B2A1E5-CE3D-D441-888E-3F500678AE0E}"/>
                 </a:ext>
               </a:extLst>
             </p:cNvPr>
@@ -17510,10 +17322,10 @@
       </p:grpSp>
       <p:grpSp>
         <p:nvGrpSpPr>
-          <p:cNvPr id="20" name="Group 19">
+          <p:cNvPr id="202" name="Group 201">
             <a:extLst>
               <a:ext uri="{FF2B5EF4-FFF2-40B4-BE49-F238E27FC236}">
-                <a16:creationId xmlns:a16="http://schemas.microsoft.com/office/drawing/2014/main" id="{AC572E2B-D7B5-1944-8E64-12C1E3440892}"/>
+                <a16:creationId xmlns:a16="http://schemas.microsoft.com/office/drawing/2014/main" id="{4EC28B78-CEAC-C74C-8D7E-3804E7FE74BD}"/>
               </a:ext>
             </a:extLst>
           </p:cNvPr>
@@ -17530,10 +17342,10 @@
         </p:grpSpPr>
         <p:pic>
           <p:nvPicPr>
-            <p:cNvPr id="63" name="Graphic 23">
+            <p:cNvPr id="203" name="Graphic 23">
               <a:extLst>
                 <a:ext uri="{FF2B5EF4-FFF2-40B4-BE49-F238E27FC236}">
-                  <a16:creationId xmlns:a16="http://schemas.microsoft.com/office/drawing/2014/main" id="{A9A206BC-98E5-3D4E-92F8-BA04FF680DC4}"/>
+                  <a16:creationId xmlns:a16="http://schemas.microsoft.com/office/drawing/2014/main" id="{2B2C8E9E-690B-EF45-B520-410E0C839828}"/>
                 </a:ext>
               </a:extLst>
             </p:cNvPr>
@@ -17543,7 +17355,7 @@
             <p:nvPr/>
           </p:nvPicPr>
           <p:blipFill>
-            <a:blip r:embed="rId7">
+            <a:blip r:embed="rId6">
               <a:extLst>
                 <a:ext uri="{28A0092B-C50C-407E-A947-70E740481C1C}">
                   <a14:useLocalDpi xmlns:a14="http://schemas.microsoft.com/office/drawing/2010/main" val="0"/>
@@ -17590,10 +17402,10 @@
         </p:pic>
         <p:sp>
           <p:nvSpPr>
-            <p:cNvPr id="64" name="Rectangle 63">
+            <p:cNvPr id="204" name="Rectangle 203">
               <a:extLst>
                 <a:ext uri="{FF2B5EF4-FFF2-40B4-BE49-F238E27FC236}">
-                  <a16:creationId xmlns:a16="http://schemas.microsoft.com/office/drawing/2014/main" id="{2648099C-267E-0748-9B52-8FA10392636E}"/>
+                  <a16:creationId xmlns:a16="http://schemas.microsoft.com/office/drawing/2014/main" id="{01379B77-6421-CE4C-B7D5-D04BF2422CCC}"/>
                 </a:ext>
               </a:extLst>
             </p:cNvPr>
@@ -17657,10 +17469,10 @@
         </p:sp>
         <p:sp>
           <p:nvSpPr>
-            <p:cNvPr id="98" name="TextBox 97">
+            <p:cNvPr id="205" name="TextBox 204">
               <a:extLst>
                 <a:ext uri="{FF2B5EF4-FFF2-40B4-BE49-F238E27FC236}">
-                  <a16:creationId xmlns:a16="http://schemas.microsoft.com/office/drawing/2014/main" id="{8EE97D4C-4B6A-104E-B9FE-FBE50CB35F61}"/>
+                  <a16:creationId xmlns:a16="http://schemas.microsoft.com/office/drawing/2014/main" id="{EF86006E-C322-1141-A9E1-C41E3A5FF884}"/>
                 </a:ext>
               </a:extLst>
             </p:cNvPr>
@@ -17703,10 +17515,10 @@
       </p:grpSp>
       <p:grpSp>
         <p:nvGrpSpPr>
-          <p:cNvPr id="17" name="Group 16">
+          <p:cNvPr id="206" name="Group 205">
             <a:extLst>
               <a:ext uri="{FF2B5EF4-FFF2-40B4-BE49-F238E27FC236}">
-                <a16:creationId xmlns:a16="http://schemas.microsoft.com/office/drawing/2014/main" id="{9790EDD1-26E9-9B4C-A065-A2530B394972}"/>
+                <a16:creationId xmlns:a16="http://schemas.microsoft.com/office/drawing/2014/main" id="{E48E7636-A136-7647-ACD8-B5A49EEE0406}"/>
               </a:ext>
             </a:extLst>
           </p:cNvPr>
@@ -17723,10 +17535,10 @@
         </p:grpSpPr>
         <p:pic>
           <p:nvPicPr>
-            <p:cNvPr id="79" name="Graphic 23">
+            <p:cNvPr id="207" name="Graphic 23">
               <a:extLst>
                 <a:ext uri="{FF2B5EF4-FFF2-40B4-BE49-F238E27FC236}">
-                  <a16:creationId xmlns:a16="http://schemas.microsoft.com/office/drawing/2014/main" id="{61F9EA1A-3A26-1A4F-8A60-D5E4D02DE553}"/>
+                  <a16:creationId xmlns:a16="http://schemas.microsoft.com/office/drawing/2014/main" id="{FAE95B71-7054-2F40-9F8A-59A74FEFB25A}"/>
                 </a:ext>
               </a:extLst>
             </p:cNvPr>
@@ -17736,7 +17548,7 @@
             <p:nvPr/>
           </p:nvPicPr>
           <p:blipFill>
-            <a:blip r:embed="rId7">
+            <a:blip r:embed="rId6">
               <a:extLst>
                 <a:ext uri="{28A0092B-C50C-407E-A947-70E740481C1C}">
                   <a14:useLocalDpi xmlns:a14="http://schemas.microsoft.com/office/drawing/2010/main" val="0"/>
@@ -17783,10 +17595,10 @@
         </p:pic>
         <p:sp>
           <p:nvSpPr>
-            <p:cNvPr id="80" name="Rectangle 79">
+            <p:cNvPr id="208" name="Rectangle 207">
               <a:extLst>
                 <a:ext uri="{FF2B5EF4-FFF2-40B4-BE49-F238E27FC236}">
-                  <a16:creationId xmlns:a16="http://schemas.microsoft.com/office/drawing/2014/main" id="{510DD321-6123-0841-9055-75788337AAD6}"/>
+                  <a16:creationId xmlns:a16="http://schemas.microsoft.com/office/drawing/2014/main" id="{91D90B8F-B766-2949-942A-361CB4991EB3}"/>
                 </a:ext>
               </a:extLst>
             </p:cNvPr>
@@ -17850,10 +17662,10 @@
         </p:sp>
         <p:sp>
           <p:nvSpPr>
-            <p:cNvPr id="100" name="TextBox 99">
+            <p:cNvPr id="209" name="TextBox 208">
               <a:extLst>
                 <a:ext uri="{FF2B5EF4-FFF2-40B4-BE49-F238E27FC236}">
-                  <a16:creationId xmlns:a16="http://schemas.microsoft.com/office/drawing/2014/main" id="{A5534EEA-46E4-F748-9585-00FA6753F232}"/>
+                  <a16:creationId xmlns:a16="http://schemas.microsoft.com/office/drawing/2014/main" id="{064DCE8E-9A4F-C949-A82D-D68FA466A786}"/>
                 </a:ext>
               </a:extLst>
             </p:cNvPr>
@@ -17896,10 +17708,10 @@
       </p:grpSp>
       <p:grpSp>
         <p:nvGrpSpPr>
-          <p:cNvPr id="16" name="Group 15">
+          <p:cNvPr id="210" name="Group 209">
             <a:extLst>
               <a:ext uri="{FF2B5EF4-FFF2-40B4-BE49-F238E27FC236}">
-                <a16:creationId xmlns:a16="http://schemas.microsoft.com/office/drawing/2014/main" id="{F97BE055-45FC-2147-8766-7808CC82F4DD}"/>
+                <a16:creationId xmlns:a16="http://schemas.microsoft.com/office/drawing/2014/main" id="{2DAB3F23-7E06-B740-BF0C-8D18D0E36AEC}"/>
               </a:ext>
             </a:extLst>
           </p:cNvPr>
@@ -17916,10 +17728,10 @@
         </p:grpSpPr>
         <p:pic>
           <p:nvPicPr>
-            <p:cNvPr id="81" name="Graphic 23">
+            <p:cNvPr id="211" name="Graphic 23">
               <a:extLst>
                 <a:ext uri="{FF2B5EF4-FFF2-40B4-BE49-F238E27FC236}">
-                  <a16:creationId xmlns:a16="http://schemas.microsoft.com/office/drawing/2014/main" id="{E0B3D372-6976-E246-B5B7-4F204A4BF5AE}"/>
+                  <a16:creationId xmlns:a16="http://schemas.microsoft.com/office/drawing/2014/main" id="{1C50ADBE-DFE7-1A47-859E-B951765B56F3}"/>
                 </a:ext>
               </a:extLst>
             </p:cNvPr>
@@ -17929,7 +17741,7 @@
             <p:nvPr/>
           </p:nvPicPr>
           <p:blipFill>
-            <a:blip r:embed="rId7">
+            <a:blip r:embed="rId6">
               <a:extLst>
                 <a:ext uri="{28A0092B-C50C-407E-A947-70E740481C1C}">
                   <a14:useLocalDpi xmlns:a14="http://schemas.microsoft.com/office/drawing/2010/main" val="0"/>
@@ -17976,10 +17788,10 @@
         </p:pic>
         <p:sp>
           <p:nvSpPr>
-            <p:cNvPr id="83" name="Rectangle 82">
+            <p:cNvPr id="212" name="Rectangle 211">
               <a:extLst>
                 <a:ext uri="{FF2B5EF4-FFF2-40B4-BE49-F238E27FC236}">
-                  <a16:creationId xmlns:a16="http://schemas.microsoft.com/office/drawing/2014/main" id="{0627381F-7DFA-0847-8562-700249C86D50}"/>
+                  <a16:creationId xmlns:a16="http://schemas.microsoft.com/office/drawing/2014/main" id="{D06620B7-2F65-7140-8F95-29B5A6FAA24C}"/>
                 </a:ext>
               </a:extLst>
             </p:cNvPr>
@@ -18043,10 +17855,10 @@
         </p:sp>
         <p:sp>
           <p:nvSpPr>
-            <p:cNvPr id="101" name="TextBox 100">
+            <p:cNvPr id="213" name="TextBox 212">
               <a:extLst>
                 <a:ext uri="{FF2B5EF4-FFF2-40B4-BE49-F238E27FC236}">
-                  <a16:creationId xmlns:a16="http://schemas.microsoft.com/office/drawing/2014/main" id="{3C3E6734-F9C1-2841-B0B9-36F1C96697F1}"/>
+                  <a16:creationId xmlns:a16="http://schemas.microsoft.com/office/drawing/2014/main" id="{9A25AA0F-5ADE-3641-B05D-F2225429EB0F}"/>
                 </a:ext>
               </a:extLst>
             </p:cNvPr>
@@ -18089,10 +17901,10 @@
       </p:grpSp>
       <p:grpSp>
         <p:nvGrpSpPr>
-          <p:cNvPr id="102" name="Group 101">
+          <p:cNvPr id="214" name="Group 213">
             <a:extLst>
               <a:ext uri="{FF2B5EF4-FFF2-40B4-BE49-F238E27FC236}">
-                <a16:creationId xmlns:a16="http://schemas.microsoft.com/office/drawing/2014/main" id="{4DE5AE6E-E99F-4343-B1D9-65F8721CF057}"/>
+                <a16:creationId xmlns:a16="http://schemas.microsoft.com/office/drawing/2014/main" id="{1902988A-F752-DD4D-A607-BD3826D88E7F}"/>
               </a:ext>
             </a:extLst>
           </p:cNvPr>
@@ -18109,10 +17921,10 @@
         </p:grpSpPr>
         <p:pic>
           <p:nvPicPr>
-            <p:cNvPr id="103" name="Graphic 23">
+            <p:cNvPr id="215" name="Graphic 23">
               <a:extLst>
                 <a:ext uri="{FF2B5EF4-FFF2-40B4-BE49-F238E27FC236}">
-                  <a16:creationId xmlns:a16="http://schemas.microsoft.com/office/drawing/2014/main" id="{CF3F02AC-56EA-6C4E-9A08-E7BF3764DDE0}"/>
+                  <a16:creationId xmlns:a16="http://schemas.microsoft.com/office/drawing/2014/main" id="{76F88B9C-4DF0-0445-8A48-CD9A014BEF25}"/>
                 </a:ext>
               </a:extLst>
             </p:cNvPr>
@@ -18122,7 +17934,7 @@
             <p:nvPr/>
           </p:nvPicPr>
           <p:blipFill>
-            <a:blip r:embed="rId7">
+            <a:blip r:embed="rId6">
               <a:extLst>
                 <a:ext uri="{28A0092B-C50C-407E-A947-70E740481C1C}">
                   <a14:useLocalDpi xmlns:a14="http://schemas.microsoft.com/office/drawing/2010/main" val="0"/>
@@ -18169,10 +17981,10 @@
         </p:pic>
         <p:sp>
           <p:nvSpPr>
-            <p:cNvPr id="104" name="Rectangle 103">
+            <p:cNvPr id="216" name="Rectangle 215">
               <a:extLst>
                 <a:ext uri="{FF2B5EF4-FFF2-40B4-BE49-F238E27FC236}">
-                  <a16:creationId xmlns:a16="http://schemas.microsoft.com/office/drawing/2014/main" id="{223154A7-1859-6546-8E6D-7DBF728ED7AC}"/>
+                  <a16:creationId xmlns:a16="http://schemas.microsoft.com/office/drawing/2014/main" id="{022B980A-1A2F-D24A-A084-417F6E32A27F}"/>
                 </a:ext>
               </a:extLst>
             </p:cNvPr>
@@ -18236,10 +18048,10 @@
         </p:sp>
         <p:sp>
           <p:nvSpPr>
-            <p:cNvPr id="105" name="TextBox 104">
+            <p:cNvPr id="217" name="TextBox 216">
               <a:extLst>
                 <a:ext uri="{FF2B5EF4-FFF2-40B4-BE49-F238E27FC236}">
-                  <a16:creationId xmlns:a16="http://schemas.microsoft.com/office/drawing/2014/main" id="{EDFE92F5-49BE-AF4D-81B4-F13FB6F35362}"/>
+                  <a16:creationId xmlns:a16="http://schemas.microsoft.com/office/drawing/2014/main" id="{6D162845-5E61-1E46-B4CA-7B22F19B5752}"/>
                 </a:ext>
               </a:extLst>
             </p:cNvPr>
@@ -18282,10 +18094,10 @@
       </p:grpSp>
       <p:grpSp>
         <p:nvGrpSpPr>
-          <p:cNvPr id="106" name="Group 105">
+          <p:cNvPr id="218" name="Group 217">
             <a:extLst>
               <a:ext uri="{FF2B5EF4-FFF2-40B4-BE49-F238E27FC236}">
-                <a16:creationId xmlns:a16="http://schemas.microsoft.com/office/drawing/2014/main" id="{02665633-2F61-6146-8B93-46D5A0067DA4}"/>
+                <a16:creationId xmlns:a16="http://schemas.microsoft.com/office/drawing/2014/main" id="{8535C536-7169-2840-A293-018E01E5146B}"/>
               </a:ext>
             </a:extLst>
           </p:cNvPr>
@@ -18302,10 +18114,10 @@
         </p:grpSpPr>
         <p:pic>
           <p:nvPicPr>
-            <p:cNvPr id="109" name="Graphic 23">
+            <p:cNvPr id="219" name="Graphic 23">
               <a:extLst>
                 <a:ext uri="{FF2B5EF4-FFF2-40B4-BE49-F238E27FC236}">
-                  <a16:creationId xmlns:a16="http://schemas.microsoft.com/office/drawing/2014/main" id="{23DA5DBE-1FE2-D142-AD7B-E0AF2ECDC7C5}"/>
+                  <a16:creationId xmlns:a16="http://schemas.microsoft.com/office/drawing/2014/main" id="{99BD12EE-FA0E-FE48-8875-3D13DB7B0C2B}"/>
                 </a:ext>
               </a:extLst>
             </p:cNvPr>
@@ -18315,7 +18127,7 @@
             <p:nvPr/>
           </p:nvPicPr>
           <p:blipFill>
-            <a:blip r:embed="rId7">
+            <a:blip r:embed="rId6">
               <a:extLst>
                 <a:ext uri="{28A0092B-C50C-407E-A947-70E740481C1C}">
                   <a14:useLocalDpi xmlns:a14="http://schemas.microsoft.com/office/drawing/2010/main" val="0"/>
@@ -18362,10 +18174,10 @@
         </p:pic>
         <p:sp>
           <p:nvSpPr>
-            <p:cNvPr id="116" name="Rectangle 115">
+            <p:cNvPr id="220" name="Rectangle 219">
               <a:extLst>
                 <a:ext uri="{FF2B5EF4-FFF2-40B4-BE49-F238E27FC236}">
-                  <a16:creationId xmlns:a16="http://schemas.microsoft.com/office/drawing/2014/main" id="{E4944B76-1AA7-5D4F-BAD2-9C341E4F07AA}"/>
+                  <a16:creationId xmlns:a16="http://schemas.microsoft.com/office/drawing/2014/main" id="{7C051608-DE8E-004C-9998-9451FC13A32F}"/>
                 </a:ext>
               </a:extLst>
             </p:cNvPr>
@@ -18429,10 +18241,10 @@
         </p:sp>
         <p:sp>
           <p:nvSpPr>
-            <p:cNvPr id="118" name="TextBox 117">
+            <p:cNvPr id="221" name="TextBox 220">
               <a:extLst>
                 <a:ext uri="{FF2B5EF4-FFF2-40B4-BE49-F238E27FC236}">
-                  <a16:creationId xmlns:a16="http://schemas.microsoft.com/office/drawing/2014/main" id="{15F0633E-00C4-0443-A2C7-D25DC1CFE1FB}"/>
+                  <a16:creationId xmlns:a16="http://schemas.microsoft.com/office/drawing/2014/main" id="{B2418596-4063-414F-85ED-8049D0400FC0}"/>
                 </a:ext>
               </a:extLst>
             </p:cNvPr>
@@ -18475,10 +18287,10 @@
       </p:grpSp>
       <p:grpSp>
         <p:nvGrpSpPr>
-          <p:cNvPr id="120" name="Group 119">
+          <p:cNvPr id="222" name="Group 221">
             <a:extLst>
               <a:ext uri="{FF2B5EF4-FFF2-40B4-BE49-F238E27FC236}">
-                <a16:creationId xmlns:a16="http://schemas.microsoft.com/office/drawing/2014/main" id="{EECBAB77-12F8-254C-8C5D-3FD2818E1B6D}"/>
+                <a16:creationId xmlns:a16="http://schemas.microsoft.com/office/drawing/2014/main" id="{0EA02F37-8FC0-8B42-9BE6-8E133E9604DF}"/>
               </a:ext>
             </a:extLst>
           </p:cNvPr>
@@ -18495,10 +18307,10 @@
         </p:grpSpPr>
         <p:pic>
           <p:nvPicPr>
-            <p:cNvPr id="122" name="Graphic 23">
+            <p:cNvPr id="223" name="Graphic 23">
               <a:extLst>
                 <a:ext uri="{FF2B5EF4-FFF2-40B4-BE49-F238E27FC236}">
-                  <a16:creationId xmlns:a16="http://schemas.microsoft.com/office/drawing/2014/main" id="{BCD9432B-FA64-E342-B515-4306A796BB81}"/>
+                  <a16:creationId xmlns:a16="http://schemas.microsoft.com/office/drawing/2014/main" id="{1D8F7DB0-5576-4945-BD85-C52EB5B58C31}"/>
                 </a:ext>
               </a:extLst>
             </p:cNvPr>
@@ -18508,7 +18320,7 @@
             <p:nvPr/>
           </p:nvPicPr>
           <p:blipFill>
-            <a:blip r:embed="rId7">
+            <a:blip r:embed="rId6">
               <a:extLst>
                 <a:ext uri="{28A0092B-C50C-407E-A947-70E740481C1C}">
                   <a14:useLocalDpi xmlns:a14="http://schemas.microsoft.com/office/drawing/2010/main" val="0"/>
@@ -18555,10 +18367,10 @@
         </p:pic>
         <p:sp>
           <p:nvSpPr>
-            <p:cNvPr id="123" name="Rectangle 122">
+            <p:cNvPr id="224" name="Rectangle 223">
               <a:extLst>
                 <a:ext uri="{FF2B5EF4-FFF2-40B4-BE49-F238E27FC236}">
-                  <a16:creationId xmlns:a16="http://schemas.microsoft.com/office/drawing/2014/main" id="{F26C1E5E-40E1-C943-B804-83B7C56B0B5A}"/>
+                  <a16:creationId xmlns:a16="http://schemas.microsoft.com/office/drawing/2014/main" id="{C5DC57D2-0D84-3842-A34B-6B448484F425}"/>
                 </a:ext>
               </a:extLst>
             </p:cNvPr>
@@ -18622,10 +18434,10 @@
         </p:sp>
         <p:sp>
           <p:nvSpPr>
-            <p:cNvPr id="124" name="TextBox 123">
+            <p:cNvPr id="225" name="TextBox 224">
               <a:extLst>
                 <a:ext uri="{FF2B5EF4-FFF2-40B4-BE49-F238E27FC236}">
-                  <a16:creationId xmlns:a16="http://schemas.microsoft.com/office/drawing/2014/main" id="{77E95564-AB1B-D445-9A5D-2C81C45FFB63}"/>
+                  <a16:creationId xmlns:a16="http://schemas.microsoft.com/office/drawing/2014/main" id="{C8ED02F1-034C-C047-8F82-B709D8740CC8}"/>
                 </a:ext>
               </a:extLst>
             </p:cNvPr>
@@ -18668,10 +18480,10 @@
       </p:grpSp>
       <p:grpSp>
         <p:nvGrpSpPr>
-          <p:cNvPr id="125" name="Group 124">
+          <p:cNvPr id="226" name="Group 225">
             <a:extLst>
               <a:ext uri="{FF2B5EF4-FFF2-40B4-BE49-F238E27FC236}">
-                <a16:creationId xmlns:a16="http://schemas.microsoft.com/office/drawing/2014/main" id="{36199EF7-AAAB-2141-BE1B-640117023E34}"/>
+                <a16:creationId xmlns:a16="http://schemas.microsoft.com/office/drawing/2014/main" id="{A92BAF03-0586-B64C-86E2-C0F358DE647F}"/>
               </a:ext>
             </a:extLst>
           </p:cNvPr>
@@ -18688,10 +18500,10 @@
         </p:grpSpPr>
         <p:pic>
           <p:nvPicPr>
-            <p:cNvPr id="126" name="Graphic 23">
+            <p:cNvPr id="227" name="Graphic 23">
               <a:extLst>
                 <a:ext uri="{FF2B5EF4-FFF2-40B4-BE49-F238E27FC236}">
-                  <a16:creationId xmlns:a16="http://schemas.microsoft.com/office/drawing/2014/main" id="{16EA6695-433B-1A44-A4A9-48E6E3A41064}"/>
+                  <a16:creationId xmlns:a16="http://schemas.microsoft.com/office/drawing/2014/main" id="{5CF99411-647F-5B47-8C0D-4EE267BEE1B5}"/>
                 </a:ext>
               </a:extLst>
             </p:cNvPr>
@@ -18701,7 +18513,7 @@
             <p:nvPr/>
           </p:nvPicPr>
           <p:blipFill>
-            <a:blip r:embed="rId7">
+            <a:blip r:embed="rId6">
               <a:extLst>
                 <a:ext uri="{28A0092B-C50C-407E-A947-70E740481C1C}">
                   <a14:useLocalDpi xmlns:a14="http://schemas.microsoft.com/office/drawing/2010/main" val="0"/>
@@ -18748,10 +18560,10 @@
         </p:pic>
         <p:sp>
           <p:nvSpPr>
-            <p:cNvPr id="127" name="Rectangle 126">
+            <p:cNvPr id="228" name="Rectangle 227">
               <a:extLst>
                 <a:ext uri="{FF2B5EF4-FFF2-40B4-BE49-F238E27FC236}">
-                  <a16:creationId xmlns:a16="http://schemas.microsoft.com/office/drawing/2014/main" id="{871C4869-B276-C04A-8F40-4A3C40CF911F}"/>
+                  <a16:creationId xmlns:a16="http://schemas.microsoft.com/office/drawing/2014/main" id="{7C20F325-EA3F-B048-ACAB-C116DF54877B}"/>
                 </a:ext>
               </a:extLst>
             </p:cNvPr>
@@ -18815,10 +18627,10 @@
         </p:sp>
         <p:sp>
           <p:nvSpPr>
-            <p:cNvPr id="132" name="TextBox 131">
+            <p:cNvPr id="229" name="TextBox 228">
               <a:extLst>
                 <a:ext uri="{FF2B5EF4-FFF2-40B4-BE49-F238E27FC236}">
-                  <a16:creationId xmlns:a16="http://schemas.microsoft.com/office/drawing/2014/main" id="{E152A485-72F3-DD42-A2AB-B7ACB8A2CDCE}"/>
+                  <a16:creationId xmlns:a16="http://schemas.microsoft.com/office/drawing/2014/main" id="{D647DB1B-261F-1641-A2AF-747391BF1961}"/>
                 </a:ext>
               </a:extLst>
             </p:cNvPr>
@@ -18861,17 +18673,17 @@
       </p:grpSp>
       <p:cxnSp>
         <p:nvCxnSpPr>
-          <p:cNvPr id="133" name="Straight Arrow Connector 64">
+          <p:cNvPr id="230" name="Straight Arrow Connector 64">
             <a:extLst>
               <a:ext uri="{FF2B5EF4-FFF2-40B4-BE49-F238E27FC236}">
-                <a16:creationId xmlns:a16="http://schemas.microsoft.com/office/drawing/2014/main" id="{E6F72842-5A3D-6446-AF04-E2A24077AC6E}"/>
+                <a16:creationId xmlns:a16="http://schemas.microsoft.com/office/drawing/2014/main" id="{01534886-35B2-CF4C-8401-D70E4A25299C}"/>
               </a:ext>
             </a:extLst>
           </p:cNvPr>
           <p:cNvCxnSpPr>
             <a:cxnSpLocks/>
-            <a:stCxn id="72" idx="3"/>
-            <a:endCxn id="104" idx="1"/>
+            <a:stCxn id="155" idx="3"/>
+            <a:endCxn id="216" idx="1"/>
           </p:cNvCxnSpPr>
           <p:nvPr/>
         </p:nvCxnSpPr>
@@ -18910,17 +18722,17 @@
       </p:cxnSp>
       <p:cxnSp>
         <p:nvCxnSpPr>
-          <p:cNvPr id="134" name="Straight Arrow Connector 64">
+          <p:cNvPr id="231" name="Straight Arrow Connector 64">
             <a:extLst>
               <a:ext uri="{FF2B5EF4-FFF2-40B4-BE49-F238E27FC236}">
-                <a16:creationId xmlns:a16="http://schemas.microsoft.com/office/drawing/2014/main" id="{6846D06C-11D2-2340-A0ED-08C97D5B5B53}"/>
+                <a16:creationId xmlns:a16="http://schemas.microsoft.com/office/drawing/2014/main" id="{A445305C-5116-8648-8E9A-0CA2EABA3683}"/>
               </a:ext>
             </a:extLst>
           </p:cNvPr>
           <p:cNvCxnSpPr>
             <a:cxnSpLocks/>
-            <a:stCxn id="72" idx="3"/>
-            <a:endCxn id="116" idx="1"/>
+            <a:stCxn id="155" idx="3"/>
+            <a:endCxn id="220" idx="1"/>
           </p:cNvCxnSpPr>
           <p:nvPr/>
         </p:nvCxnSpPr>
@@ -18959,10 +18771,10 @@
       </p:cxnSp>
       <p:sp>
         <p:nvSpPr>
-          <p:cNvPr id="135" name="TextBox 134">
+          <p:cNvPr id="232" name="TextBox 231">
             <a:extLst>
               <a:ext uri="{FF2B5EF4-FFF2-40B4-BE49-F238E27FC236}">
-                <a16:creationId xmlns:a16="http://schemas.microsoft.com/office/drawing/2014/main" id="{6F1193FC-ECC5-5F4E-82B5-0425EE003038}"/>
+                <a16:creationId xmlns:a16="http://schemas.microsoft.com/office/drawing/2014/main" id="{7BB39BF6-BFB4-D74F-9624-63FFB2723E00}"/>
               </a:ext>
             </a:extLst>
           </p:cNvPr>
@@ -18998,6 +18810,872 @@
                 <a:cs typeface="Arial" panose="020B0604020202020204" pitchFamily="34" charset="0"/>
               </a:rPr>
               <a:t>ClickHouse client</a:t>
+            </a:r>
+          </a:p>
+        </p:txBody>
+      </p:sp>
+      <p:pic>
+        <p:nvPicPr>
+          <p:cNvPr id="233" name="Graphic 19">
+            <a:extLst>
+              <a:ext uri="{FF2B5EF4-FFF2-40B4-BE49-F238E27FC236}">
+                <a16:creationId xmlns:a16="http://schemas.microsoft.com/office/drawing/2014/main" id="{30ECD76A-59DF-BC47-A8D7-F7EABFE154F5}"/>
+              </a:ext>
+            </a:extLst>
+          </p:cNvPr>
+          <p:cNvPicPr>
+            <a:picLocks noChangeAspect="1" noChangeArrowheads="1"/>
+          </p:cNvPicPr>
+          <p:nvPr/>
+        </p:nvPicPr>
+        <p:blipFill>
+          <a:blip r:embed="rId18">
+            <a:extLst>
+              <a:ext uri="{28A0092B-C50C-407E-A947-70E740481C1C}">
+                <a14:useLocalDpi xmlns:a14="http://schemas.microsoft.com/office/drawing/2010/main" val="0"/>
+              </a:ext>
+            </a:extLst>
+          </a:blip>
+          <a:srcRect/>
+          <a:stretch>
+            <a:fillRect/>
+          </a:stretch>
+        </p:blipFill>
+        <p:spPr bwMode="auto">
+          <a:xfrm>
+            <a:off x="467162" y="1014896"/>
+            <a:ext cx="193893" cy="193893"/>
+          </a:xfrm>
+          <a:prstGeom prst="rect">
+            <a:avLst/>
+          </a:prstGeom>
+          <a:noFill/>
+          <a:ln>
+            <a:noFill/>
+          </a:ln>
+          <a:extLst>
+            <a:ext uri="{909E8E84-426E-40DD-AFC4-6F175D3DCCD1}">
+              <a14:hiddenFill xmlns:a14="http://schemas.microsoft.com/office/drawing/2010/main">
+                <a:solidFill>
+                  <a:srgbClr val="FFFFFF"/>
+                </a:solidFill>
+              </a14:hiddenFill>
+            </a:ext>
+            <a:ext uri="{91240B29-F687-4F45-9708-019B960494DF}">
+              <a14:hiddenLine xmlns:a14="http://schemas.microsoft.com/office/drawing/2010/main" w="9525">
+                <a:solidFill>
+                  <a:srgbClr val="000000"/>
+                </a:solidFill>
+                <a:miter lim="800000"/>
+                <a:headEnd/>
+                <a:tailEnd/>
+              </a14:hiddenLine>
+            </a:ext>
+          </a:extLst>
+        </p:spPr>
+      </p:pic>
+      <p:sp>
+        <p:nvSpPr>
+          <p:cNvPr id="234" name="Rectangle 233">
+            <a:extLst>
+              <a:ext uri="{FF2B5EF4-FFF2-40B4-BE49-F238E27FC236}">
+                <a16:creationId xmlns:a16="http://schemas.microsoft.com/office/drawing/2014/main" id="{6CFB7BD6-AF6C-C04A-A99E-7ED6D8049D7E}"/>
+              </a:ext>
+            </a:extLst>
+          </p:cNvPr>
+          <p:cNvSpPr/>
+          <p:nvPr/>
+        </p:nvSpPr>
+        <p:spPr>
+          <a:xfrm>
+            <a:off x="1516468" y="2697882"/>
+            <a:ext cx="3621001" cy="310374"/>
+          </a:xfrm>
+          <a:prstGeom prst="rect">
+            <a:avLst/>
+          </a:prstGeom>
+          <a:noFill/>
+          <a:ln w="12700">
+            <a:solidFill>
+              <a:srgbClr val="D86613"/>
+            </a:solidFill>
+            <a:prstDash val="dash"/>
+          </a:ln>
+        </p:spPr>
+        <p:style>
+          <a:lnRef idx="2">
+            <a:schemeClr val="accent1">
+              <a:shade val="50000"/>
+            </a:schemeClr>
+          </a:lnRef>
+          <a:fillRef idx="1">
+            <a:schemeClr val="accent1"/>
+          </a:fillRef>
+          <a:effectRef idx="0">
+            <a:schemeClr val="accent1"/>
+          </a:effectRef>
+          <a:fontRef idx="minor">
+            <a:schemeClr val="lt1"/>
+          </a:fontRef>
+        </p:style>
+        <p:txBody>
+          <a:bodyPr tIns="91440"/>
+          <a:lstStyle/>
+          <a:p>
+            <a:pPr algn="ctr" eaLnBrk="1" fontAlgn="auto" hangingPunct="1">
+              <a:spcBef>
+                <a:spcPts val="0"/>
+              </a:spcBef>
+              <a:spcAft>
+                <a:spcPts val="0"/>
+              </a:spcAft>
+              <a:defRPr/>
+            </a:pPr>
+            <a:endParaRPr lang="en-US" sz="600" dirty="0">
+              <a:solidFill>
+                <a:srgbClr val="D86613"/>
+              </a:solidFill>
+              <a:latin typeface="Arial" panose="020B0604020202020204" pitchFamily="34" charset="0"/>
+              <a:cs typeface="Arial" panose="020B0604020202020204" pitchFamily="34" charset="0"/>
+            </a:endParaRPr>
+          </a:p>
+        </p:txBody>
+      </p:sp>
+      <p:pic>
+        <p:nvPicPr>
+          <p:cNvPr id="235" name="Graphic 18">
+            <a:extLst>
+              <a:ext uri="{FF2B5EF4-FFF2-40B4-BE49-F238E27FC236}">
+                <a16:creationId xmlns:a16="http://schemas.microsoft.com/office/drawing/2014/main" id="{859C3493-7635-8245-A288-807AED118C8A}"/>
+              </a:ext>
+            </a:extLst>
+          </p:cNvPr>
+          <p:cNvPicPr>
+            <a:picLocks noChangeAspect="1" noChangeArrowheads="1"/>
+          </p:cNvPicPr>
+          <p:nvPr/>
+        </p:nvPicPr>
+        <p:blipFill>
+          <a:blip r:embed="rId7">
+            <a:extLst>
+              <a:ext uri="{28A0092B-C50C-407E-A947-70E740481C1C}">
+                <a14:useLocalDpi xmlns:a14="http://schemas.microsoft.com/office/drawing/2010/main" val="0"/>
+              </a:ext>
+            </a:extLst>
+          </a:blip>
+          <a:srcRect/>
+          <a:stretch>
+            <a:fillRect/>
+          </a:stretch>
+        </p:blipFill>
+        <p:spPr bwMode="auto">
+          <a:xfrm>
+            <a:off x="3201676" y="2684333"/>
+            <a:ext cx="236778" cy="213418"/>
+          </a:xfrm>
+          <a:prstGeom prst="rect">
+            <a:avLst/>
+          </a:prstGeom>
+          <a:noFill/>
+          <a:ln>
+            <a:noFill/>
+          </a:ln>
+          <a:extLst>
+            <a:ext uri="{909E8E84-426E-40DD-AFC4-6F175D3DCCD1}">
+              <a14:hiddenFill xmlns:a14="http://schemas.microsoft.com/office/drawing/2010/main">
+                <a:solidFill>
+                  <a:srgbClr val="FFFFFF"/>
+                </a:solidFill>
+              </a14:hiddenFill>
+            </a:ext>
+            <a:ext uri="{91240B29-F687-4F45-9708-019B960494DF}">
+              <a14:hiddenLine xmlns:a14="http://schemas.microsoft.com/office/drawing/2010/main" w="9525">
+                <a:solidFill>
+                  <a:srgbClr val="000000"/>
+                </a:solidFill>
+                <a:miter lim="800000"/>
+                <a:headEnd/>
+                <a:tailEnd/>
+              </a14:hiddenLine>
+            </a:ext>
+          </a:extLst>
+        </p:spPr>
+      </p:pic>
+      <p:sp>
+        <p:nvSpPr>
+          <p:cNvPr id="236" name="TextBox 235">
+            <a:extLst>
+              <a:ext uri="{FF2B5EF4-FFF2-40B4-BE49-F238E27FC236}">
+                <a16:creationId xmlns:a16="http://schemas.microsoft.com/office/drawing/2014/main" id="{DE71C608-0ACB-EF4D-988C-08B918DAC750}"/>
+              </a:ext>
+            </a:extLst>
+          </p:cNvPr>
+          <p:cNvSpPr txBox="1"/>
+          <p:nvPr/>
+        </p:nvSpPr>
+        <p:spPr>
+          <a:xfrm>
+            <a:off x="1855825" y="2025906"/>
+            <a:ext cx="881933" cy="184666"/>
+          </a:xfrm>
+          <a:prstGeom prst="rect">
+            <a:avLst/>
+          </a:prstGeom>
+          <a:noFill/>
+        </p:spPr>
+        <p:txBody>
+          <a:bodyPr wrap="square" rtlCol="0">
+            <a:spAutoFit/>
+          </a:bodyPr>
+          <a:lstStyle/>
+          <a:p>
+            <a:pPr>
+              <a:defRPr/>
+            </a:pPr>
+            <a:r>
+              <a:rPr lang="en-CN" sz="600" dirty="0">
+                <a:ln w="0"/>
+                <a:solidFill>
+                  <a:srgbClr val="D86613"/>
+                </a:solidFill>
+                <a:latin typeface="Arial" panose="020B0604020202020204" pitchFamily="34" charset="0"/>
+                <a:cs typeface="Arial" panose="020B0604020202020204" pitchFamily="34" charset="0"/>
+              </a:rPr>
+              <a:t>Bastion instance</a:t>
+            </a:r>
+          </a:p>
+        </p:txBody>
+      </p:sp>
+      <p:sp>
+        <p:nvSpPr>
+          <p:cNvPr id="237" name="TextBox 236">
+            <a:extLst>
+              <a:ext uri="{FF2B5EF4-FFF2-40B4-BE49-F238E27FC236}">
+                <a16:creationId xmlns:a16="http://schemas.microsoft.com/office/drawing/2014/main" id="{68D991BD-233F-2345-96A0-88E4461F1270}"/>
+              </a:ext>
+            </a:extLst>
+          </p:cNvPr>
+          <p:cNvSpPr txBox="1"/>
+          <p:nvPr/>
+        </p:nvSpPr>
+        <p:spPr>
+          <a:xfrm>
+            <a:off x="4243973" y="2032471"/>
+            <a:ext cx="881933" cy="184666"/>
+          </a:xfrm>
+          <a:prstGeom prst="rect">
+            <a:avLst/>
+          </a:prstGeom>
+          <a:noFill/>
+        </p:spPr>
+        <p:txBody>
+          <a:bodyPr wrap="square" rtlCol="0">
+            <a:spAutoFit/>
+          </a:bodyPr>
+          <a:lstStyle/>
+          <a:p>
+            <a:pPr>
+              <a:defRPr/>
+            </a:pPr>
+            <a:r>
+              <a:rPr lang="en-CN" sz="600" dirty="0">
+                <a:ln w="0"/>
+                <a:solidFill>
+                  <a:srgbClr val="D86613"/>
+                </a:solidFill>
+                <a:latin typeface="Arial" panose="020B0604020202020204" pitchFamily="34" charset="0"/>
+                <a:cs typeface="Arial" panose="020B0604020202020204" pitchFamily="34" charset="0"/>
+              </a:rPr>
+              <a:t>Bastion instance</a:t>
+            </a:r>
+          </a:p>
+        </p:txBody>
+      </p:sp>
+      <p:sp>
+        <p:nvSpPr>
+          <p:cNvPr id="238" name="Rectangle 237">
+            <a:extLst>
+              <a:ext uri="{FF2B5EF4-FFF2-40B4-BE49-F238E27FC236}">
+                <a16:creationId xmlns:a16="http://schemas.microsoft.com/office/drawing/2014/main" id="{54030433-9421-4342-B094-5ABFA3B140AA}"/>
+              </a:ext>
+            </a:extLst>
+          </p:cNvPr>
+          <p:cNvSpPr/>
+          <p:nvPr/>
+        </p:nvSpPr>
+        <p:spPr>
+          <a:xfrm>
+            <a:off x="4003670" y="2011556"/>
+            <a:ext cx="1061269" cy="215192"/>
+          </a:xfrm>
+          <a:prstGeom prst="rect">
+            <a:avLst/>
+          </a:prstGeom>
+          <a:solidFill>
+            <a:schemeClr val="bg1">
+              <a:alpha val="66000"/>
+            </a:schemeClr>
+          </a:solidFill>
+          <a:ln>
+            <a:noFill/>
+          </a:ln>
+          <a:effectLst/>
+        </p:spPr>
+        <p:style>
+          <a:lnRef idx="1">
+            <a:schemeClr val="accent1"/>
+          </a:lnRef>
+          <a:fillRef idx="3">
+            <a:schemeClr val="accent1"/>
+          </a:fillRef>
+          <a:effectRef idx="2">
+            <a:schemeClr val="accent1"/>
+          </a:effectRef>
+          <a:fontRef idx="minor">
+            <a:schemeClr val="lt1"/>
+          </a:fontRef>
+        </p:style>
+        <p:txBody>
+          <a:bodyPr rtlCol="0" anchor="ctr"/>
+          <a:lstStyle/>
+          <a:p>
+            <a:pPr algn="ctr"/>
+            <a:endParaRPr lang="en-CN" sz="1100" dirty="0"/>
+          </a:p>
+        </p:txBody>
+      </p:sp>
+      <p:sp>
+        <p:nvSpPr>
+          <p:cNvPr id="239" name="TextBox 238">
+            <a:extLst>
+              <a:ext uri="{FF2B5EF4-FFF2-40B4-BE49-F238E27FC236}">
+                <a16:creationId xmlns:a16="http://schemas.microsoft.com/office/drawing/2014/main" id="{D4ED27DD-E630-5C4D-B1BD-59FD4E02B3AB}"/>
+              </a:ext>
+            </a:extLst>
+          </p:cNvPr>
+          <p:cNvSpPr txBox="1"/>
+          <p:nvPr/>
+        </p:nvSpPr>
+        <p:spPr>
+          <a:xfrm>
+            <a:off x="2888417" y="2143244"/>
+            <a:ext cx="881933" cy="184666"/>
+          </a:xfrm>
+          <a:prstGeom prst="rect">
+            <a:avLst/>
+          </a:prstGeom>
+          <a:noFill/>
+        </p:spPr>
+        <p:txBody>
+          <a:bodyPr wrap="square" rtlCol="0">
+            <a:spAutoFit/>
+          </a:bodyPr>
+          <a:lstStyle/>
+          <a:p>
+            <a:pPr>
+              <a:defRPr/>
+            </a:pPr>
+            <a:r>
+              <a:rPr lang="en-CN" sz="600" dirty="0">
+                <a:ln w="0"/>
+                <a:solidFill>
+                  <a:srgbClr val="D86613"/>
+                </a:solidFill>
+                <a:latin typeface="Arial" panose="020B0604020202020204" pitchFamily="34" charset="0"/>
+                <a:cs typeface="Arial" panose="020B0604020202020204" pitchFamily="34" charset="0"/>
+              </a:rPr>
+              <a:t>Auto Scaling group</a:t>
+            </a:r>
+          </a:p>
+        </p:txBody>
+      </p:sp>
+      <p:sp>
+        <p:nvSpPr>
+          <p:cNvPr id="240" name="TextBox 239">
+            <a:extLst>
+              <a:ext uri="{FF2B5EF4-FFF2-40B4-BE49-F238E27FC236}">
+                <a16:creationId xmlns:a16="http://schemas.microsoft.com/office/drawing/2014/main" id="{BAE25AE5-81D6-3D4B-8B6B-308D4925DD38}"/>
+              </a:ext>
+            </a:extLst>
+          </p:cNvPr>
+          <p:cNvSpPr txBox="1"/>
+          <p:nvPr/>
+        </p:nvSpPr>
+        <p:spPr>
+          <a:xfrm>
+            <a:off x="2878024" y="2850999"/>
+            <a:ext cx="881933" cy="184666"/>
+          </a:xfrm>
+          <a:prstGeom prst="rect">
+            <a:avLst/>
+          </a:prstGeom>
+          <a:noFill/>
+        </p:spPr>
+        <p:txBody>
+          <a:bodyPr wrap="square" rtlCol="0">
+            <a:spAutoFit/>
+          </a:bodyPr>
+          <a:lstStyle/>
+          <a:p>
+            <a:pPr>
+              <a:defRPr/>
+            </a:pPr>
+            <a:r>
+              <a:rPr lang="en-CN" sz="600" dirty="0">
+                <a:ln w="0"/>
+                <a:solidFill>
+                  <a:srgbClr val="D86613"/>
+                </a:solidFill>
+                <a:latin typeface="Arial" panose="020B0604020202020204" pitchFamily="34" charset="0"/>
+                <a:cs typeface="Arial" panose="020B0604020202020204" pitchFamily="34" charset="0"/>
+              </a:rPr>
+              <a:t>Auto Scaling group</a:t>
+            </a:r>
+          </a:p>
+        </p:txBody>
+      </p:sp>
+      <p:sp>
+        <p:nvSpPr>
+          <p:cNvPr id="241" name="Rectangle 240">
+            <a:extLst>
+              <a:ext uri="{FF2B5EF4-FFF2-40B4-BE49-F238E27FC236}">
+                <a16:creationId xmlns:a16="http://schemas.microsoft.com/office/drawing/2014/main" id="{180989D4-CFB1-F24A-B7E3-DAB6744C0AAE}"/>
+              </a:ext>
+            </a:extLst>
+          </p:cNvPr>
+          <p:cNvSpPr/>
+          <p:nvPr/>
+        </p:nvSpPr>
+        <p:spPr>
+          <a:xfrm>
+            <a:off x="4006176" y="2751840"/>
+            <a:ext cx="1054444" cy="218783"/>
+          </a:xfrm>
+          <a:prstGeom prst="rect">
+            <a:avLst/>
+          </a:prstGeom>
+          <a:noFill/>
+          <a:ln w="12700">
+            <a:solidFill>
+              <a:srgbClr val="D86613"/>
+            </a:solidFill>
+          </a:ln>
+        </p:spPr>
+        <p:style>
+          <a:lnRef idx="2">
+            <a:schemeClr val="accent1">
+              <a:shade val="50000"/>
+            </a:schemeClr>
+          </a:lnRef>
+          <a:fillRef idx="1">
+            <a:schemeClr val="accent1"/>
+          </a:fillRef>
+          <a:effectRef idx="0">
+            <a:schemeClr val="accent1"/>
+          </a:effectRef>
+          <a:fontRef idx="minor">
+            <a:schemeClr val="lt1"/>
+          </a:fontRef>
+        </p:style>
+        <p:txBody>
+          <a:bodyPr lIns="457200" tIns="91440"/>
+          <a:lstStyle/>
+          <a:p>
+            <a:pPr eaLnBrk="1" fontAlgn="auto" hangingPunct="1">
+              <a:spcBef>
+                <a:spcPts val="0"/>
+              </a:spcBef>
+              <a:spcAft>
+                <a:spcPts val="0"/>
+              </a:spcAft>
+              <a:defRPr/>
+            </a:pPr>
+            <a:endParaRPr lang="en-US" sz="600" dirty="0">
+              <a:ln w="0"/>
+              <a:solidFill>
+                <a:srgbClr val="D86613"/>
+              </a:solidFill>
+              <a:latin typeface="Arial" panose="020B0604020202020204" pitchFamily="34" charset="0"/>
+              <a:cs typeface="Arial" panose="020B0604020202020204" pitchFamily="34" charset="0"/>
+            </a:endParaRPr>
+          </a:p>
+        </p:txBody>
+      </p:sp>
+      <p:pic>
+        <p:nvPicPr>
+          <p:cNvPr id="242" name="Graphic 23">
+            <a:extLst>
+              <a:ext uri="{FF2B5EF4-FFF2-40B4-BE49-F238E27FC236}">
+                <a16:creationId xmlns:a16="http://schemas.microsoft.com/office/drawing/2014/main" id="{75A87E39-DADB-514C-A499-A105245A5CB9}"/>
+              </a:ext>
+            </a:extLst>
+          </p:cNvPr>
+          <p:cNvPicPr>
+            <a:picLocks noChangeAspect="1" noChangeArrowheads="1"/>
+          </p:cNvPicPr>
+          <p:nvPr/>
+        </p:nvPicPr>
+        <p:blipFill>
+          <a:blip r:embed="rId6">
+            <a:extLst>
+              <a:ext uri="{28A0092B-C50C-407E-A947-70E740481C1C}">
+                <a14:useLocalDpi xmlns:a14="http://schemas.microsoft.com/office/drawing/2010/main" val="0"/>
+              </a:ext>
+            </a:extLst>
+          </a:blip>
+          <a:srcRect/>
+          <a:stretch>
+            <a:fillRect/>
+          </a:stretch>
+        </p:blipFill>
+        <p:spPr bwMode="auto">
+          <a:xfrm>
+            <a:off x="4004808" y="2758139"/>
+            <a:ext cx="236778" cy="213418"/>
+          </a:xfrm>
+          <a:prstGeom prst="rect">
+            <a:avLst/>
+          </a:prstGeom>
+          <a:noFill/>
+          <a:ln>
+            <a:noFill/>
+          </a:ln>
+          <a:extLst>
+            <a:ext uri="{909E8E84-426E-40DD-AFC4-6F175D3DCCD1}">
+              <a14:hiddenFill xmlns:a14="http://schemas.microsoft.com/office/drawing/2010/main">
+                <a:solidFill>
+                  <a:srgbClr val="FFFFFF"/>
+                </a:solidFill>
+              </a14:hiddenFill>
+            </a:ext>
+            <a:ext uri="{91240B29-F687-4F45-9708-019B960494DF}">
+              <a14:hiddenLine xmlns:a14="http://schemas.microsoft.com/office/drawing/2010/main" w="9525">
+                <a:solidFill>
+                  <a:srgbClr val="000000"/>
+                </a:solidFill>
+                <a:miter lim="800000"/>
+                <a:headEnd/>
+                <a:tailEnd/>
+              </a14:hiddenLine>
+            </a:ext>
+          </a:extLst>
+        </p:spPr>
+      </p:pic>
+      <p:sp>
+        <p:nvSpPr>
+          <p:cNvPr id="243" name="TextBox 242">
+            <a:extLst>
+              <a:ext uri="{FF2B5EF4-FFF2-40B4-BE49-F238E27FC236}">
+                <a16:creationId xmlns:a16="http://schemas.microsoft.com/office/drawing/2014/main" id="{D42D0C32-B91A-5346-A6C8-6FC35E4F1E0E}"/>
+              </a:ext>
+            </a:extLst>
+          </p:cNvPr>
+          <p:cNvSpPr txBox="1"/>
+          <p:nvPr/>
+        </p:nvSpPr>
+        <p:spPr>
+          <a:xfrm>
+            <a:off x="4224368" y="2769022"/>
+            <a:ext cx="881933" cy="184666"/>
+          </a:xfrm>
+          <a:prstGeom prst="rect">
+            <a:avLst/>
+          </a:prstGeom>
+          <a:noFill/>
+        </p:spPr>
+        <p:txBody>
+          <a:bodyPr wrap="square" rtlCol="0">
+            <a:spAutoFit/>
+          </a:bodyPr>
+          <a:lstStyle/>
+          <a:p>
+            <a:pPr>
+              <a:defRPr/>
+            </a:pPr>
+            <a:r>
+              <a:rPr lang="en-CN" sz="600" dirty="0">
+                <a:ln w="0"/>
+                <a:solidFill>
+                  <a:srgbClr val="D86613"/>
+                </a:solidFill>
+                <a:latin typeface="Arial" panose="020B0604020202020204" pitchFamily="34" charset="0"/>
+                <a:cs typeface="Arial" panose="020B0604020202020204" pitchFamily="34" charset="0"/>
+              </a:rPr>
+              <a:t>ClickHouse client</a:t>
+            </a:r>
+          </a:p>
+        </p:txBody>
+      </p:sp>
+      <p:sp>
+        <p:nvSpPr>
+          <p:cNvPr id="244" name="Rectangle 243">
+            <a:extLst>
+              <a:ext uri="{FF2B5EF4-FFF2-40B4-BE49-F238E27FC236}">
+                <a16:creationId xmlns:a16="http://schemas.microsoft.com/office/drawing/2014/main" id="{A25D5F8D-9616-FC48-AF84-AE588497C174}"/>
+              </a:ext>
+            </a:extLst>
+          </p:cNvPr>
+          <p:cNvSpPr/>
+          <p:nvPr/>
+        </p:nvSpPr>
+        <p:spPr>
+          <a:xfrm>
+            <a:off x="4001952" y="2753354"/>
+            <a:ext cx="1061269" cy="215192"/>
+          </a:xfrm>
+          <a:prstGeom prst="rect">
+            <a:avLst/>
+          </a:prstGeom>
+          <a:solidFill>
+            <a:schemeClr val="bg1">
+              <a:alpha val="66000"/>
+            </a:schemeClr>
+          </a:solidFill>
+          <a:ln>
+            <a:noFill/>
+          </a:ln>
+          <a:effectLst/>
+        </p:spPr>
+        <p:style>
+          <a:lnRef idx="1">
+            <a:schemeClr val="accent1"/>
+          </a:lnRef>
+          <a:fillRef idx="3">
+            <a:schemeClr val="accent1"/>
+          </a:fillRef>
+          <a:effectRef idx="2">
+            <a:schemeClr val="accent1"/>
+          </a:effectRef>
+          <a:fontRef idx="minor">
+            <a:schemeClr val="lt1"/>
+          </a:fontRef>
+        </p:style>
+        <p:txBody>
+          <a:bodyPr rtlCol="0" anchor="ctr"/>
+          <a:lstStyle/>
+          <a:p>
+            <a:pPr algn="ctr"/>
+            <a:endParaRPr lang="en-CN" sz="1100" dirty="0"/>
+          </a:p>
+        </p:txBody>
+      </p:sp>
+      <p:pic>
+        <p:nvPicPr>
+          <p:cNvPr id="245" name="Graphic 17">
+            <a:extLst>
+              <a:ext uri="{FF2B5EF4-FFF2-40B4-BE49-F238E27FC236}">
+                <a16:creationId xmlns:a16="http://schemas.microsoft.com/office/drawing/2014/main" id="{F4A72584-214B-704E-A869-B44D9D3AF1A7}"/>
+              </a:ext>
+            </a:extLst>
+          </p:cNvPr>
+          <p:cNvPicPr>
+            <a:picLocks noChangeAspect="1" noChangeArrowheads="1"/>
+          </p:cNvPicPr>
+          <p:nvPr/>
+        </p:nvPicPr>
+        <p:blipFill>
+          <a:blip r:embed="rId19">
+            <a:extLst>
+              <a:ext uri="{28A0092B-C50C-407E-A947-70E740481C1C}">
+                <a14:useLocalDpi xmlns:a14="http://schemas.microsoft.com/office/drawing/2010/main" val="0"/>
+              </a:ext>
+            </a:extLst>
+          </a:blip>
+          <a:srcRect/>
+          <a:stretch>
+            <a:fillRect/>
+          </a:stretch>
+        </p:blipFill>
+        <p:spPr bwMode="auto">
+          <a:xfrm>
+            <a:off x="5365743" y="4041666"/>
+            <a:ext cx="206137" cy="206137"/>
+          </a:xfrm>
+          <a:prstGeom prst="rect">
+            <a:avLst/>
+          </a:prstGeom>
+          <a:noFill/>
+          <a:ln>
+            <a:noFill/>
+          </a:ln>
+          <a:extLst>
+            <a:ext uri="{909E8E84-426E-40DD-AFC4-6F175D3DCCD1}">
+              <a14:hiddenFill xmlns:a14="http://schemas.microsoft.com/office/drawing/2010/main">
+                <a:solidFill>
+                  <a:srgbClr val="FFFFFF"/>
+                </a:solidFill>
+              </a14:hiddenFill>
+            </a:ext>
+            <a:ext uri="{91240B29-F687-4F45-9708-019B960494DF}">
+              <a14:hiddenLine xmlns:a14="http://schemas.microsoft.com/office/drawing/2010/main" w="9525">
+                <a:solidFill>
+                  <a:srgbClr val="000000"/>
+                </a:solidFill>
+                <a:miter lim="800000"/>
+                <a:headEnd/>
+                <a:tailEnd/>
+              </a14:hiddenLine>
+            </a:ext>
+          </a:extLst>
+        </p:spPr>
+      </p:pic>
+      <p:sp>
+        <p:nvSpPr>
+          <p:cNvPr id="246" name="TextBox 9">
+            <a:extLst>
+              <a:ext uri="{FF2B5EF4-FFF2-40B4-BE49-F238E27FC236}">
+                <a16:creationId xmlns:a16="http://schemas.microsoft.com/office/drawing/2014/main" id="{BEDC82B0-025D-124D-9C49-91531176D483}"/>
+              </a:ext>
+            </a:extLst>
+          </p:cNvPr>
+          <p:cNvSpPr txBox="1">
+            <a:spLocks noChangeArrowheads="1"/>
+          </p:cNvSpPr>
+          <p:nvPr/>
+        </p:nvSpPr>
+        <p:spPr bwMode="auto">
+          <a:xfrm>
+            <a:off x="5540793" y="4060176"/>
+            <a:ext cx="1075906" cy="184666"/>
+          </a:xfrm>
+          <a:prstGeom prst="rect">
+            <a:avLst/>
+          </a:prstGeom>
+          <a:noFill/>
+          <a:ln>
+            <a:noFill/>
+          </a:ln>
+          <a:extLst>
+            <a:ext uri="{909E8E84-426E-40DD-AFC4-6F175D3DCCD1}">
+              <a14:hiddenFill xmlns:a14="http://schemas.microsoft.com/office/drawing/2010/main">
+                <a:solidFill>
+                  <a:srgbClr val="FFFFFF"/>
+                </a:solidFill>
+              </a14:hiddenFill>
+            </a:ext>
+            <a:ext uri="{91240B29-F687-4F45-9708-019B960494DF}">
+              <a14:hiddenLine xmlns:a14="http://schemas.microsoft.com/office/drawing/2010/main" w="9525">
+                <a:solidFill>
+                  <a:srgbClr val="000000"/>
+                </a:solidFill>
+                <a:miter lim="800000"/>
+                <a:headEnd/>
+                <a:tailEnd/>
+              </a14:hiddenLine>
+            </a:ext>
+          </a:extLst>
+        </p:spPr>
+        <p:txBody>
+          <a:bodyPr wrap="square">
+            <a:spAutoFit/>
+          </a:bodyPr>
+          <a:lstStyle>
+            <a:lvl1pPr>
+              <a:defRPr>
+                <a:solidFill>
+                  <a:schemeClr val="tx1"/>
+                </a:solidFill>
+                <a:latin typeface="Calibri" panose="020F0502020204030204" pitchFamily="34" charset="0"/>
+              </a:defRPr>
+            </a:lvl1pPr>
+            <a:lvl2pPr marL="742950" indent="-285750">
+              <a:defRPr>
+                <a:solidFill>
+                  <a:schemeClr val="tx1"/>
+                </a:solidFill>
+                <a:latin typeface="Calibri" panose="020F0502020204030204" pitchFamily="34" charset="0"/>
+              </a:defRPr>
+            </a:lvl2pPr>
+            <a:lvl3pPr marL="1143000" indent="-228600">
+              <a:defRPr>
+                <a:solidFill>
+                  <a:schemeClr val="tx1"/>
+                </a:solidFill>
+                <a:latin typeface="Calibri" panose="020F0502020204030204" pitchFamily="34" charset="0"/>
+              </a:defRPr>
+            </a:lvl3pPr>
+            <a:lvl4pPr marL="1600200" indent="-228600">
+              <a:defRPr>
+                <a:solidFill>
+                  <a:schemeClr val="tx1"/>
+                </a:solidFill>
+                <a:latin typeface="Calibri" panose="020F0502020204030204" pitchFamily="34" charset="0"/>
+              </a:defRPr>
+            </a:lvl4pPr>
+            <a:lvl5pPr marL="2057400" indent="-228600">
+              <a:defRPr>
+                <a:solidFill>
+                  <a:schemeClr val="tx1"/>
+                </a:solidFill>
+                <a:latin typeface="Calibri" panose="020F0502020204030204" pitchFamily="34" charset="0"/>
+              </a:defRPr>
+            </a:lvl5pPr>
+            <a:lvl6pPr marL="2514600" indent="-228600" eaLnBrk="0" fontAlgn="base" hangingPunct="0">
+              <a:spcBef>
+                <a:spcPct val="0"/>
+              </a:spcBef>
+              <a:spcAft>
+                <a:spcPct val="0"/>
+              </a:spcAft>
+              <a:defRPr>
+                <a:solidFill>
+                  <a:schemeClr val="tx1"/>
+                </a:solidFill>
+                <a:latin typeface="Calibri" panose="020F0502020204030204" pitchFamily="34" charset="0"/>
+              </a:defRPr>
+            </a:lvl6pPr>
+            <a:lvl7pPr marL="2971800" indent="-228600" eaLnBrk="0" fontAlgn="base" hangingPunct="0">
+              <a:spcBef>
+                <a:spcPct val="0"/>
+              </a:spcBef>
+              <a:spcAft>
+                <a:spcPct val="0"/>
+              </a:spcAft>
+              <a:defRPr>
+                <a:solidFill>
+                  <a:schemeClr val="tx1"/>
+                </a:solidFill>
+                <a:latin typeface="Calibri" panose="020F0502020204030204" pitchFamily="34" charset="0"/>
+              </a:defRPr>
+            </a:lvl7pPr>
+            <a:lvl8pPr marL="3429000" indent="-228600" eaLnBrk="0" fontAlgn="base" hangingPunct="0">
+              <a:spcBef>
+                <a:spcPct val="0"/>
+              </a:spcBef>
+              <a:spcAft>
+                <a:spcPct val="0"/>
+              </a:spcAft>
+              <a:defRPr>
+                <a:solidFill>
+                  <a:schemeClr val="tx1"/>
+                </a:solidFill>
+                <a:latin typeface="Calibri" panose="020F0502020204030204" pitchFamily="34" charset="0"/>
+              </a:defRPr>
+            </a:lvl8pPr>
+            <a:lvl9pPr marL="3886200" indent="-228600" eaLnBrk="0" fontAlgn="base" hangingPunct="0">
+              <a:spcBef>
+                <a:spcPct val="0"/>
+              </a:spcBef>
+              <a:spcAft>
+                <a:spcPct val="0"/>
+              </a:spcAft>
+              <a:defRPr>
+                <a:solidFill>
+                  <a:schemeClr val="tx1"/>
+                </a:solidFill>
+                <a:latin typeface="Calibri" panose="020F0502020204030204" pitchFamily="34" charset="0"/>
+              </a:defRPr>
+            </a:lvl9pPr>
+          </a:lstStyle>
+          <a:p>
+            <a:pPr algn="ctr" eaLnBrk="1" hangingPunct="1"/>
+            <a:r>
+              <a:rPr lang="en-US" altLang="en-US" sz="600" dirty="0">
+                <a:latin typeface="Arial" panose="020B0604020202020204" pitchFamily="34" charset="0"/>
+                <a:ea typeface="Amazon Ember" panose="020B0603020204020204" pitchFamily="34" charset="0"/>
+                <a:cs typeface="Arial" panose="020B0604020202020204" pitchFamily="34" charset="0"/>
+              </a:rPr>
+              <a:t>Amazon Secrets Manager</a:t>
             </a:r>
           </a:p>
         </p:txBody>
@@ -20262,18 +20940,18 @@
 </file>
 
 <file path=customXml/item1.xml><?xml version="1.0" encoding="utf-8"?>
-<p:properties xmlns:p="http://schemas.microsoft.com/office/2006/metadata/properties" xmlns:xsi="http://www.w3.org/2001/XMLSchema-instance">
-  <documentManagement/>
-</p:properties>
-</file>
-
-<file path=customXml/item2.xml><?xml version="1.0" encoding="utf-8"?>
 <?mso-contentType ?>
 <FormTemplates xmlns="http://schemas.microsoft.com/sharepoint/v3/contenttype/forms">
   <Display>DocumentLibraryForm</Display>
   <Edit>DocumentLibraryForm</Edit>
   <New>DocumentLibraryForm</New>
 </FormTemplates>
+</file>
+
+<file path=customXml/item2.xml><?xml version="1.0" encoding="utf-8"?>
+<p:properties xmlns:p="http://schemas.microsoft.com/office/2006/metadata/properties" xmlns:xsi="http://www.w3.org/2001/XMLSchema-instance">
+  <documentManagement/>
+</p:properties>
 </file>
 
 <file path=customXml/item3.xml><?xml version="1.0" encoding="utf-8"?>
@@ -20391,6 +21069,14 @@
 </file>
 
 <file path=customXml/itemProps1.xml><?xml version="1.0" encoding="utf-8"?>
+<ds:datastoreItem xmlns:ds="http://schemas.openxmlformats.org/officeDocument/2006/customXml" ds:itemID="{705B35A6-8B52-46A5-AE45-B98C6459DC10}">
+  <ds:schemaRefs>
+    <ds:schemaRef ds:uri="http://schemas.microsoft.com/sharepoint/v3/contenttype/forms"/>
+  </ds:schemaRefs>
+</ds:datastoreItem>
+</file>
+
+<file path=customXml/itemProps2.xml><?xml version="1.0" encoding="utf-8"?>
 <ds:datastoreItem xmlns:ds="http://schemas.openxmlformats.org/officeDocument/2006/customXml" ds:itemID="{C597C89A-FD0C-431E-81F6-90225B937683}">
   <ds:schemaRefs>
     <ds:schemaRef ds:uri="http://schemas.microsoft.com/office/infopath/2007/PartnerControls"/>
@@ -20401,14 +21087,6 @@
     <ds:schemaRef ds:uri="http://purl.org/dc/terms/"/>
     <ds:schemaRef ds:uri="http://schemas.microsoft.com/office/2006/metadata/properties"/>
     <ds:schemaRef ds:uri="http://purl.org/dc/elements/1.1/"/>
-  </ds:schemaRefs>
-</ds:datastoreItem>
-</file>
-
-<file path=customXml/itemProps2.xml><?xml version="1.0" encoding="utf-8"?>
-<ds:datastoreItem xmlns:ds="http://schemas.openxmlformats.org/officeDocument/2006/customXml" ds:itemID="{705B35A6-8B52-46A5-AE45-B98C6459DC10}">
-  <ds:schemaRefs>
-    <ds:schemaRef ds:uri="http://schemas.microsoft.com/sharepoint/v3/contenttype/forms"/>
   </ds:schemaRefs>
 </ds:datastoreItem>
 </file>

</xml_diff>